<commit_message>
Major slide changes to Fd Poison and add in challenge 1 solution
</commit_message>
<xml_diff>
--- a/challenges/leaks/leaks.pptx
+++ b/challenges/leaks/leaks.pptx
@@ -5,7 +5,7 @@
     <p:sldMasterId id="2147483660" r:id="rId1"/>
   </p:sldMasterIdLst>
   <p:notesMasterIdLst>
-    <p:notesMasterId r:id="rId41"/>
+    <p:notesMasterId r:id="rId47"/>
   </p:notesMasterIdLst>
   <p:sldIdLst>
     <p:sldId id="440" r:id="rId2"/>
@@ -30,23 +30,29 @@
     <p:sldId id="476" r:id="rId21"/>
     <p:sldId id="447" r:id="rId22"/>
     <p:sldId id="456" r:id="rId23"/>
-    <p:sldId id="458" r:id="rId24"/>
-    <p:sldId id="477" r:id="rId25"/>
-    <p:sldId id="459" r:id="rId26"/>
-    <p:sldId id="461" r:id="rId27"/>
-    <p:sldId id="460" r:id="rId28"/>
-    <p:sldId id="464" r:id="rId29"/>
-    <p:sldId id="463" r:id="rId30"/>
-    <p:sldId id="443" r:id="rId31"/>
-    <p:sldId id="470" r:id="rId32"/>
-    <p:sldId id="468" r:id="rId33"/>
-    <p:sldId id="469" r:id="rId34"/>
-    <p:sldId id="445" r:id="rId35"/>
-    <p:sldId id="471" r:id="rId36"/>
+    <p:sldId id="477" r:id="rId24"/>
+    <p:sldId id="459" r:id="rId25"/>
+    <p:sldId id="461" r:id="rId26"/>
+    <p:sldId id="460" r:id="rId27"/>
+    <p:sldId id="464" r:id="rId28"/>
+    <p:sldId id="463" r:id="rId29"/>
+    <p:sldId id="443" r:id="rId30"/>
+    <p:sldId id="470" r:id="rId31"/>
+    <p:sldId id="468" r:id="rId32"/>
+    <p:sldId id="469" r:id="rId33"/>
+    <p:sldId id="445" r:id="rId34"/>
+    <p:sldId id="471" r:id="rId35"/>
+    <p:sldId id="478" r:id="rId36"/>
     <p:sldId id="465" r:id="rId37"/>
     <p:sldId id="466" r:id="rId38"/>
-    <p:sldId id="472" r:id="rId39"/>
-    <p:sldId id="444" r:id="rId40"/>
+    <p:sldId id="484" r:id="rId39"/>
+    <p:sldId id="483" r:id="rId40"/>
+    <p:sldId id="472" r:id="rId41"/>
+    <p:sldId id="485" r:id="rId42"/>
+    <p:sldId id="479" r:id="rId43"/>
+    <p:sldId id="481" r:id="rId44"/>
+    <p:sldId id="480" r:id="rId45"/>
+    <p:sldId id="482" r:id="rId46"/>
   </p:sldIdLst>
   <p:sldSz cx="9144000" cy="5143500" type="screen16x9"/>
   <p:notesSz cx="6858000" cy="9144000"/>
@@ -12141,8 +12147,8 @@
         <a:lstStyle/>
         <a:p>
           <a:r>
-            <a:rPr lang="en-US"/>
-            <a:t>Pointers to other projects (heap)</a:t>
+            <a:rPr lang="en-US" dirty="0"/>
+            <a:t>Pointers to other things (heap)</a:t>
           </a:r>
         </a:p>
       </dgm:t>
@@ -13835,42 +13841,6 @@
         </a:p>
       </dgm:t>
     </dgm:pt>
-    <dgm:pt modelId="{4094D83B-5149-455C-A811-3175E51AF8C1}">
-      <dgm:prSet/>
-      <dgm:spPr/>
-      <dgm:t>
-        <a:bodyPr/>
-        <a:lstStyle/>
-        <a:p>
-          <a:r>
-            <a:rPr lang="en-US" dirty="0"/>
-            <a:t>Out of bounds reads to leak program address</a:t>
-          </a:r>
-        </a:p>
-      </dgm:t>
-    </dgm:pt>
-    <dgm:pt modelId="{2E43568A-A905-442E-BBDA-0FD7394E7287}" type="parTrans" cxnId="{7F7035DA-9FEB-4AB7-B56A-10105638CD0D}">
-      <dgm:prSet/>
-      <dgm:spPr/>
-      <dgm:t>
-        <a:bodyPr/>
-        <a:lstStyle/>
-        <a:p>
-          <a:endParaRPr lang="en-US"/>
-        </a:p>
-      </dgm:t>
-    </dgm:pt>
-    <dgm:pt modelId="{55927292-4FB8-4FA6-BF5A-DF34420BF91B}" type="sibTrans" cxnId="{7F7035DA-9FEB-4AB7-B56A-10105638CD0D}">
-      <dgm:prSet/>
-      <dgm:spPr/>
-      <dgm:t>
-        <a:bodyPr/>
-        <a:lstStyle/>
-        <a:p>
-          <a:endParaRPr lang="en-US"/>
-        </a:p>
-      </dgm:t>
-    </dgm:pt>
     <dgm:pt modelId="{2FA84453-2208-40F6-8082-68135D5BCD7B}">
       <dgm:prSet/>
       <dgm:spPr/>
@@ -14217,15 +14187,13 @@
     <dgm:cxn modelId="{527BBB04-078D-764E-BF1F-836D4BADC236}" type="presOf" srcId="{F71D823E-30ED-49EC-9CC1-AFAD0A9D0363}" destId="{050107EC-ED66-4747-B3CA-2E642E07ABB6}" srcOrd="1" destOrd="0" presId="urn:microsoft.com/office/officeart/2005/8/layout/list1"/>
     <dgm:cxn modelId="{06D80D0B-8122-4957-AA86-99DB8661ACDF}" srcId="{AC3F0A11-009A-4CDD-8D49-CEAE90804788}" destId="{F71D823E-30ED-49EC-9CC1-AFAD0A9D0363}" srcOrd="0" destOrd="0" parTransId="{1EBECC89-E5D1-4AE9-82F3-4FD324D5C041}" sibTransId="{614068F9-174E-4E84-B9AC-6B3EE6C86726}"/>
     <dgm:cxn modelId="{6FD1720B-B3BF-074C-B8E8-E7B4CB711DBD}" type="presOf" srcId="{2FA84453-2208-40F6-8082-68135D5BCD7B}" destId="{641F1FF7-5D25-2642-B7EB-35A7A152ADD1}" srcOrd="1" destOrd="0" presId="urn:microsoft.com/office/officeart/2005/8/layout/list1"/>
-    <dgm:cxn modelId="{98D8A60F-2BC3-D744-BB2B-6B45C035E84B}" type="presOf" srcId="{4094D83B-5149-455C-A811-3175E51AF8C1}" destId="{1499A69D-2C71-D842-8CA7-74A389A2FC85}" srcOrd="0" destOrd="0" presId="urn:microsoft.com/office/officeart/2005/8/layout/list1"/>
     <dgm:cxn modelId="{41EA4A1B-7DB2-694F-9367-65B8D5714397}" type="presOf" srcId="{8705C23E-8392-4358-84DA-53DCC381165C}" destId="{94914026-F8B0-054F-8468-15B245FE38D6}" srcOrd="0" destOrd="0" presId="urn:microsoft.com/office/officeart/2005/8/layout/list1"/>
     <dgm:cxn modelId="{6B434220-0C25-4AD3-81F3-403165A1A05C}" srcId="{2FA84453-2208-40F6-8082-68135D5BCD7B}" destId="{5BB98A0A-A624-4CA4-A846-54CE7159B92B}" srcOrd="0" destOrd="0" parTransId="{9B4C16B7-A9E1-4FCB-86BC-462FA34800B4}" sibTransId="{470CA1DE-285A-402A-A40F-A2C4967CA421}"/>
     <dgm:cxn modelId="{D383CA27-77EB-A34E-8704-260C1BD06B49}" type="presOf" srcId="{2FA84453-2208-40F6-8082-68135D5BCD7B}" destId="{972EAE7B-E04B-9C44-A3FA-532B9D97A71B}" srcOrd="0" destOrd="0" presId="urn:microsoft.com/office/officeart/2005/8/layout/list1"/>
     <dgm:cxn modelId="{B97BEC33-D62E-0D4A-91E3-B53F1D28EFB5}" type="presOf" srcId="{8705C23E-8392-4358-84DA-53DCC381165C}" destId="{629E74F9-C71B-3048-8F8F-559354CB4155}" srcOrd="1" destOrd="0" presId="urn:microsoft.com/office/officeart/2005/8/layout/list1"/>
-    <dgm:cxn modelId="{33C2F937-317D-C84B-9353-B37A3B76B96A}" type="presOf" srcId="{F86FC588-AAA0-E946-82D6-34CE4A3987C6}" destId="{1499A69D-2C71-D842-8CA7-74A389A2FC85}" srcOrd="0" destOrd="1" presId="urn:microsoft.com/office/officeart/2005/8/layout/list1"/>
     <dgm:cxn modelId="{F1F97147-D6AD-2140-89CC-4A380191B524}" type="presOf" srcId="{AC3F0A11-009A-4CDD-8D49-CEAE90804788}" destId="{EE4901C7-4928-6C4C-88D7-26DFB8AA1FD6}" srcOrd="0" destOrd="0" presId="urn:microsoft.com/office/officeart/2005/8/layout/list1"/>
     <dgm:cxn modelId="{D82A6348-8EC2-4536-A017-7CB126D9B1DC}" srcId="{AC3F0A11-009A-4CDD-8D49-CEAE90804788}" destId="{8705C23E-8392-4358-84DA-53DCC381165C}" srcOrd="2" destOrd="0" parTransId="{3830A866-7501-4559-94CC-9CE007959B08}" sibTransId="{005AA663-FB27-45CC-878B-1EA67414DBF8}"/>
-    <dgm:cxn modelId="{F8F56C5D-6430-6841-A235-CA552C1D06D5}" srcId="{F71D823E-30ED-49EC-9CC1-AFAD0A9D0363}" destId="{F86FC588-AAA0-E946-82D6-34CE4A3987C6}" srcOrd="1" destOrd="0" parTransId="{0CC4B244-D7E1-824D-A478-3D7EF8ED44A1}" sibTransId="{7F73C2F3-1F1B-A945-B6A4-5B8A8CE834E7}"/>
+    <dgm:cxn modelId="{F8F56C5D-6430-6841-A235-CA552C1D06D5}" srcId="{F71D823E-30ED-49EC-9CC1-AFAD0A9D0363}" destId="{F86FC588-AAA0-E946-82D6-34CE4A3987C6}" srcOrd="0" destOrd="0" parTransId="{0CC4B244-D7E1-824D-A478-3D7EF8ED44A1}" sibTransId="{7F73C2F3-1F1B-A945-B6A4-5B8A8CE834E7}"/>
     <dgm:cxn modelId="{6E20C86A-18DA-4FAA-9773-343331559062}" srcId="{AC3F0A11-009A-4CDD-8D49-CEAE90804788}" destId="{2FA84453-2208-40F6-8082-68135D5BCD7B}" srcOrd="1" destOrd="0" parTransId="{00735EF1-C50D-4D50-80D3-21210CE72923}" sibTransId="{C446EA3A-4BDA-48F0-B4C6-3A84E9C99A90}"/>
     <dgm:cxn modelId="{1D35FE79-C185-BE45-A766-D5E531C46310}" type="presOf" srcId="{2750AD17-BCE9-BC4C-B677-7A3396ACB444}" destId="{B6A8E909-6526-4D42-B3C8-A7637174591E}" srcOrd="1" destOrd="0" presId="urn:microsoft.com/office/officeart/2005/8/layout/list1"/>
     <dgm:cxn modelId="{0EEDAC7A-2F2F-224F-A465-2245DF96778B}" srcId="{AC3F0A11-009A-4CDD-8D49-CEAE90804788}" destId="{2750AD17-BCE9-BC4C-B677-7A3396ACB444}" srcOrd="3" destOrd="0" parTransId="{B5841844-74A7-D04A-BE18-2806F69E5591}" sibTransId="{E1DF80A6-80FD-794C-9C57-00C7721D93B5}"/>
@@ -14233,8 +14201,8 @@
     <dgm:cxn modelId="{42968D97-65E2-3043-BA7C-31286118212B}" type="presOf" srcId="{2750AD17-BCE9-BC4C-B677-7A3396ACB444}" destId="{9D963472-F8D8-9844-A580-FF1E729F004F}" srcOrd="0" destOrd="0" presId="urn:microsoft.com/office/officeart/2005/8/layout/list1"/>
     <dgm:cxn modelId="{F3741BA5-5220-1C4B-AD59-6EDC00E24A3D}" type="presOf" srcId="{F51FBD16-159B-A343-8853-D3518702A4BF}" destId="{53542EAE-A6EE-8045-A0BC-5688EB7D4DB3}" srcOrd="0" destOrd="0" presId="urn:microsoft.com/office/officeart/2005/8/layout/list1"/>
     <dgm:cxn modelId="{3EA0ABD4-739A-4049-BF42-76D8A579E30A}" type="presOf" srcId="{5BB98A0A-A624-4CA4-A846-54CE7159B92B}" destId="{CB9D60BC-A08A-EF4F-A64B-3A6DCA21484A}" srcOrd="0" destOrd="0" presId="urn:microsoft.com/office/officeart/2005/8/layout/list1"/>
-    <dgm:cxn modelId="{7F7035DA-9FEB-4AB7-B56A-10105638CD0D}" srcId="{F71D823E-30ED-49EC-9CC1-AFAD0A9D0363}" destId="{4094D83B-5149-455C-A811-3175E51AF8C1}" srcOrd="0" destOrd="0" parTransId="{2E43568A-A905-442E-BBDA-0FD7394E7287}" sibTransId="{55927292-4FB8-4FA6-BF5A-DF34420BF91B}"/>
     <dgm:cxn modelId="{209492E1-276E-224A-9879-4B7330DA3D76}" srcId="{2750AD17-BCE9-BC4C-B677-7A3396ACB444}" destId="{F51FBD16-159B-A343-8853-D3518702A4BF}" srcOrd="0" destOrd="0" parTransId="{8643D926-FFEA-A94F-BF88-D10122451751}" sibTransId="{6CEC72B5-90D5-EE4C-A71D-9795F4A1C749}"/>
+    <dgm:cxn modelId="{505511EE-B673-8C4D-9DD4-84B587B1DC01}" type="presOf" srcId="{F86FC588-AAA0-E946-82D6-34CE4A3987C6}" destId="{1499A69D-2C71-D842-8CA7-74A389A2FC85}" srcOrd="0" destOrd="0" presId="urn:microsoft.com/office/officeart/2005/8/layout/list1"/>
     <dgm:cxn modelId="{442B9DD2-C923-EE4E-8FB6-3F356E7E1E16}" type="presParOf" srcId="{EE4901C7-4928-6C4C-88D7-26DFB8AA1FD6}" destId="{18A50822-2236-A549-AD34-67FBEE1C10B4}" srcOrd="0" destOrd="0" presId="urn:microsoft.com/office/officeart/2005/8/layout/list1"/>
     <dgm:cxn modelId="{E8E02BAC-C2B5-124E-912C-F6CF1B74BCA9}" type="presParOf" srcId="{18A50822-2236-A549-AD34-67FBEE1C10B4}" destId="{C766C22F-34FA-0C4C-9F11-3CC44F773BE2}" srcOrd="0" destOrd="0" presId="urn:microsoft.com/office/officeart/2005/8/layout/list1"/>
     <dgm:cxn modelId="{F51BAA2E-973D-FD4E-8240-038D7F14C791}" type="presParOf" srcId="{18A50822-2236-A549-AD34-67FBEE1C10B4}" destId="{050107EC-ED66-4747-B3CA-2E642E07ABB6}" srcOrd="1" destOrd="0" presId="urn:microsoft.com/office/officeart/2005/8/layout/list1"/>
@@ -17291,8 +17259,8 @@
             <a:buChar char="•"/>
           </a:pPr>
           <a:r>
-            <a:rPr lang="en-US" sz="2100" kern="1200"/>
-            <a:t>Pointers to other projects (heap)</a:t>
+            <a:rPr lang="en-US" sz="2100" kern="1200" dirty="0"/>
+            <a:t>Pointers to other things (heap)</a:t>
           </a:r>
         </a:p>
         <a:p>
@@ -19278,8 +19246,8 @@
       </dsp:nvSpPr>
       <dsp:spPr>
         <a:xfrm>
-          <a:off x="0" y="291445"/>
-          <a:ext cx="4630057" cy="1304100"/>
+          <a:off x="0" y="560770"/>
+          <a:ext cx="4630057" cy="765450"/>
         </a:xfrm>
         <a:prstGeom prst="rect">
           <a:avLst/>
@@ -19338,32 +19306,14 @@
             <a:buChar char="•"/>
           </a:pPr>
           <a:r>
-            <a:rPr lang="en-US" sz="1800" kern="1200" dirty="0"/>
-            <a:t>Out of bounds reads to leak program address</a:t>
-          </a:r>
-        </a:p>
-        <a:p>
-          <a:pPr marL="171450" lvl="1" indent="-171450" algn="l" defTabSz="800100">
-            <a:lnSpc>
-              <a:spcPct val="90000"/>
-            </a:lnSpc>
-            <a:spcBef>
-              <a:spcPct val="0"/>
-            </a:spcBef>
-            <a:spcAft>
-              <a:spcPct val="15000"/>
-            </a:spcAft>
-            <a:buChar char="•"/>
-          </a:pPr>
-          <a:r>
             <a:rPr lang="en-US" sz="1800" b="1" kern="1200" dirty="0"/>
             <a:t>Again, focus of this module </a:t>
           </a:r>
         </a:p>
       </dsp:txBody>
       <dsp:txXfrm>
-        <a:off x="0" y="291445"/>
-        <a:ext cx="4630057" cy="1304100"/>
+        <a:off x="0" y="560770"/>
+        <a:ext cx="4630057" cy="765450"/>
       </dsp:txXfrm>
     </dsp:sp>
     <dsp:sp modelId="{050107EC-ED66-4747-B3CA-2E642E07ABB6}">
@@ -19373,7 +19323,7 @@
       </dsp:nvSpPr>
       <dsp:spPr>
         <a:xfrm>
-          <a:off x="231502" y="25765"/>
+          <a:off x="231502" y="295090"/>
           <a:ext cx="3241039" cy="531360"/>
         </a:xfrm>
         <a:prstGeom prst="roundRect">
@@ -19440,7 +19390,7 @@
         </a:p>
       </dsp:txBody>
       <dsp:txXfrm>
-        <a:off x="257441" y="51704"/>
+        <a:off x="257441" y="321029"/>
         <a:ext cx="3189161" cy="479482"/>
       </dsp:txXfrm>
     </dsp:sp>
@@ -19451,7 +19401,7 @@
       </dsp:nvSpPr>
       <dsp:spPr>
         <a:xfrm>
-          <a:off x="0" y="1958425"/>
+          <a:off x="0" y="1689100"/>
           <a:ext cx="4630057" cy="453600"/>
         </a:xfrm>
         <a:prstGeom prst="rect">
@@ -19514,7 +19464,7 @@
         </a:p>
       </dsp:txBody>
       <dsp:txXfrm>
-        <a:off x="0" y="1958425"/>
+        <a:off x="0" y="1689100"/>
         <a:ext cx="4630057" cy="453600"/>
       </dsp:txXfrm>
     </dsp:sp>
@@ -19525,7 +19475,7 @@
       </dsp:nvSpPr>
       <dsp:spPr>
         <a:xfrm>
-          <a:off x="231502" y="1692745"/>
+          <a:off x="231502" y="1423420"/>
           <a:ext cx="3241039" cy="531360"/>
         </a:xfrm>
         <a:prstGeom prst="roundRect">
@@ -19592,7 +19542,7 @@
         </a:p>
       </dsp:txBody>
       <dsp:txXfrm>
-        <a:off x="257441" y="1718684"/>
+        <a:off x="257441" y="1449359"/>
         <a:ext cx="3189161" cy="479482"/>
       </dsp:txXfrm>
     </dsp:sp>
@@ -19603,7 +19553,7 @@
       </dsp:nvSpPr>
       <dsp:spPr>
         <a:xfrm>
-          <a:off x="0" y="2774906"/>
+          <a:off x="0" y="2505581"/>
           <a:ext cx="4630057" cy="453600"/>
         </a:xfrm>
         <a:prstGeom prst="rect">
@@ -19652,7 +19602,7 @@
       </dsp:nvSpPr>
       <dsp:spPr>
         <a:xfrm>
-          <a:off x="231502" y="2509225"/>
+          <a:off x="231502" y="2239900"/>
           <a:ext cx="3241039" cy="531360"/>
         </a:xfrm>
         <a:prstGeom prst="roundRect">
@@ -19719,7 +19669,7 @@
         </a:p>
       </dsp:txBody>
       <dsp:txXfrm>
-        <a:off x="257441" y="2535164"/>
+        <a:off x="257441" y="2265839"/>
         <a:ext cx="3189161" cy="479482"/>
       </dsp:txXfrm>
     </dsp:sp>
@@ -19730,7 +19680,7 @@
       </dsp:nvSpPr>
       <dsp:spPr>
         <a:xfrm>
-          <a:off x="0" y="3591386"/>
+          <a:off x="0" y="3322061"/>
           <a:ext cx="4630057" cy="765450"/>
         </a:xfrm>
         <a:prstGeom prst="rect">
@@ -19800,7 +19750,7 @@
         </a:p>
       </dsp:txBody>
       <dsp:txXfrm>
-        <a:off x="0" y="3591386"/>
+        <a:off x="0" y="3322061"/>
         <a:ext cx="4630057" cy="765450"/>
       </dsp:txXfrm>
     </dsp:sp>
@@ -19811,7 +19761,7 @@
       </dsp:nvSpPr>
       <dsp:spPr>
         <a:xfrm>
-          <a:off x="231502" y="3325706"/>
+          <a:off x="231502" y="3056380"/>
           <a:ext cx="3241039" cy="531360"/>
         </a:xfrm>
         <a:prstGeom prst="roundRect">
@@ -19878,7 +19828,7 @@
         </a:p>
       </dsp:txBody>
       <dsp:txXfrm>
-        <a:off x="257441" y="3351645"/>
+        <a:off x="257441" y="3082319"/>
         <a:ext cx="3189161" cy="479482"/>
       </dsp:txXfrm>
     </dsp:sp>
@@ -39839,7 +39789,7 @@
           <a:p>
             <a:fld id="{2DA23E8D-1792-1541-9147-970A8DD8A355}" type="datetimeFigureOut">
               <a:rPr lang="en-US" smtClean="0"/>
-              <a:t>5/26/21</a:t>
+              <a:t>5/27/21</a:t>
             </a:fld>
             <a:endParaRPr lang="en-US" dirty="0"/>
           </a:p>
@@ -40570,7 +40520,7 @@
                 <a:latin typeface="Calibri"/>
               </a:rPr>
               <a:pPr/>
-              <a:t>5/26/21</a:t>
+              <a:t>5/27/21</a:t>
             </a:fld>
             <a:endParaRPr lang="en-US" dirty="0">
               <a:solidFill>
@@ -40823,7 +40773,7 @@
                 <a:latin typeface="Calibri"/>
               </a:rPr>
               <a:pPr/>
-              <a:t>5/26/21</a:t>
+              <a:t>5/27/21</a:t>
             </a:fld>
             <a:endParaRPr lang="en-US" dirty="0">
               <a:solidFill>
@@ -41038,7 +40988,7 @@
                 <a:latin typeface="Calibri"/>
               </a:rPr>
               <a:pPr/>
-              <a:t>5/26/21</a:t>
+              <a:t>5/27/21</a:t>
             </a:fld>
             <a:endParaRPr lang="en-US" dirty="0">
               <a:solidFill>
@@ -41322,7 +41272,7 @@
                 <a:latin typeface="Calibri"/>
               </a:rPr>
               <a:pPr/>
-              <a:t>5/26/21</a:t>
+              <a:t>5/27/21</a:t>
             </a:fld>
             <a:endParaRPr lang="en-US" dirty="0">
               <a:solidFill>
@@ -41664,7 +41614,7 @@
                 <a:latin typeface="Calibri"/>
               </a:rPr>
               <a:pPr/>
-              <a:t>5/26/21</a:t>
+              <a:t>5/27/21</a:t>
             </a:fld>
             <a:endParaRPr lang="en-US" dirty="0">
               <a:solidFill>
@@ -41992,7 +41942,7 @@
                 <a:latin typeface="Calibri"/>
               </a:rPr>
               <a:pPr/>
-              <a:t>5/26/21</a:t>
+              <a:t>5/27/21</a:t>
             </a:fld>
             <a:endParaRPr lang="en-US" dirty="0">
               <a:solidFill>
@@ -42481,7 +42431,7 @@
                 <a:latin typeface="Calibri"/>
               </a:rPr>
               <a:pPr/>
-              <a:t>5/26/21</a:t>
+              <a:t>5/27/21</a:t>
             </a:fld>
             <a:endParaRPr lang="en-US" dirty="0">
               <a:solidFill>
@@ -42664,7 +42614,7 @@
                 <a:latin typeface="Calibri"/>
               </a:rPr>
               <a:pPr/>
-              <a:t>5/26/21</a:t>
+              <a:t>5/27/21</a:t>
             </a:fld>
             <a:endParaRPr lang="en-US" dirty="0">
               <a:solidFill>
@@ -42910,7 +42860,7 @@
                 <a:latin typeface="Calibri"/>
               </a:rPr>
               <a:pPr/>
-              <a:t>5/26/21</a:t>
+              <a:t>5/27/21</a:t>
             </a:fld>
             <a:endParaRPr lang="en-US" dirty="0">
               <a:solidFill>
@@ -43252,7 +43202,7 @@
                 <a:latin typeface="Calibri"/>
               </a:rPr>
               <a:pPr/>
-              <a:t>5/26/21</a:t>
+              <a:t>5/27/21</a:t>
             </a:fld>
             <a:endParaRPr lang="en-US" dirty="0">
               <a:solidFill>
@@ -43544,7 +43494,7 @@
                 <a:latin typeface="Calibri"/>
               </a:rPr>
               <a:pPr/>
-              <a:t>5/26/21</a:t>
+              <a:t>5/27/21</a:t>
             </a:fld>
             <a:endParaRPr lang="en-US" dirty="0">
               <a:solidFill>
@@ -43794,7 +43744,7 @@
                 <a:latin typeface="Calibri"/>
               </a:rPr>
               <a:pPr defTabSz="914400"/>
-              <a:t>5/26/21</a:t>
+              <a:t>5/27/21</a:t>
             </a:fld>
             <a:endParaRPr lang="en-US" dirty="0">
               <a:solidFill>
@@ -44375,7 +44325,7 @@
             <p:ph idx="1"/>
             <p:extLst>
               <p:ext uri="{D42A27DB-BD31-4B8C-83A1-F6EECF244321}">
-                <p14:modId xmlns:p14="http://schemas.microsoft.com/office/powerpoint/2010/main" val="3799574949"/>
+                <p14:modId xmlns:p14="http://schemas.microsoft.com/office/powerpoint/2010/main" val="2218635586"/>
               </p:ext>
             </p:extLst>
           </p:nvPr>
@@ -44492,7 +44442,7 @@
             <a:pPr lvl="1"/>
             <a:r>
               <a:rPr lang="en-US" dirty="0"/>
-              <a:t>Most exploits require information leak and code execution as separate bugs </a:t>
+              <a:t>Most exploits require information leak and memory corruption as separate bugs </a:t>
             </a:r>
             <a:r>
               <a:rPr lang="en-US" dirty="0">
@@ -45178,7 +45128,7 @@
           <a:p>
             <a:r>
               <a:rPr lang="en-US" dirty="0"/>
-              <a:t>Pointer Gets Reused</a:t>
+              <a:t>Memory Gets Reused</a:t>
             </a:r>
           </a:p>
         </p:txBody>
@@ -45243,7 +45193,7 @@
           <a:p>
             <a:r>
               <a:rPr lang="en-US" dirty="0"/>
-              <a:t>Secret Data memory never gets initialized</a:t>
+              <a:t>Memory never gets initialized with values</a:t>
             </a:r>
           </a:p>
           <a:p>
@@ -45253,7 +45203,7 @@
             </a:r>
             <a:r>
               <a:rPr lang="en-US" dirty="0"/>
-              <a:t> (new) pointer points to </a:t>
+              <a:t> (new) pointer points to old location of </a:t>
             </a:r>
             <a:r>
               <a:rPr lang="en-US" b="1" i="1" dirty="0"/>
@@ -45261,24 +45211,13 @@
             </a:r>
             <a:r>
               <a:rPr lang="en-US" dirty="0"/>
-              <a:t> data</a:t>
+              <a:t> data memory</a:t>
             </a:r>
           </a:p>
           <a:p>
-            <a:r>
-              <a:rPr lang="en-US" dirty="0"/>
-              <a:t>Read secret data from </a:t>
-            </a:r>
-            <a:r>
-              <a:rPr lang="en-US" b="1" i="1" dirty="0"/>
-              <a:t>Second</a:t>
-            </a:r>
-            <a:r>
-              <a:rPr lang="en-US" dirty="0"/>
-              <a:t> pointer</a:t>
-            </a:r>
-          </a:p>
-          <a:p>
+            <a:pPr marL="0" indent="0">
+              <a:buNone/>
+            </a:pPr>
             <a:endParaRPr lang="en-US" dirty="0"/>
           </a:p>
         </p:txBody>
@@ -45667,7 +45606,7 @@
           <a:p>
             <a:r>
               <a:rPr lang="en-US" dirty="0"/>
-              <a:t>Starts with a basic TCache Chunk</a:t>
+              <a:t>Starts with a basic TCache sized Chunk</a:t>
             </a:r>
           </a:p>
           <a:p>
@@ -46644,206 +46583,6 @@
         </p:nvSpPr>
         <p:spPr>
           <a:xfrm>
-            <a:off x="629841" y="1260872"/>
-            <a:ext cx="4275311" cy="617934"/>
-          </a:xfrm>
-        </p:spPr>
-        <p:txBody>
-          <a:bodyPr>
-            <a:normAutofit fontScale="92500"/>
-          </a:bodyPr>
-          <a:lstStyle/>
-          <a:p>
-            <a:r>
-              <a:rPr lang="en-US" dirty="0"/>
-              <a:t>Heap Chunk in TCache Bin (free)</a:t>
-            </a:r>
-          </a:p>
-        </p:txBody>
-      </p:sp>
-      <p:sp>
-        <p:nvSpPr>
-          <p:cNvPr id="12" name="Content Placeholder 3">
-            <a:extLst>
-              <a:ext uri="{FF2B5EF4-FFF2-40B4-BE49-F238E27FC236}">
-                <a16:creationId xmlns:a16="http://schemas.microsoft.com/office/drawing/2014/main" id="{95D6093F-E1EB-4E11-A22B-927FEDB82DC3}"/>
-              </a:ext>
-            </a:extLst>
-          </p:cNvPr>
-          <p:cNvSpPr>
-            <a:spLocks noGrp="1"/>
-          </p:cNvSpPr>
-          <p:nvPr>
-            <p:ph sz="quarter" idx="4"/>
-          </p:nvPr>
-        </p:nvSpPr>
-        <p:spPr>
-          <a:xfrm>
-            <a:off x="4629156" y="1878809"/>
-            <a:ext cx="3887391" cy="2763441"/>
-          </a:xfrm>
-        </p:spPr>
-        <p:txBody>
-          <a:bodyPr>
-            <a:normAutofit/>
-          </a:bodyPr>
-          <a:lstStyle/>
-          <a:p>
-            <a:r>
-              <a:rPr lang="en-US" dirty="0"/>
-              <a:t>What if we directly read the heap chunk that is free? </a:t>
-            </a:r>
-          </a:p>
-          <a:p>
-            <a:pPr lvl="1"/>
-            <a:r>
-              <a:rPr lang="en-US" dirty="0"/>
-              <a:t>UAF read</a:t>
-            </a:r>
-          </a:p>
-          <a:p>
-            <a:r>
-              <a:rPr lang="en-US" dirty="0"/>
-              <a:t>Will </a:t>
-            </a:r>
-            <a:r>
-              <a:rPr lang="en-US" b="1" i="1" dirty="0"/>
-              <a:t>show</a:t>
-            </a:r>
-            <a:r>
-              <a:rPr lang="en-US" dirty="0"/>
-              <a:t> the address of the </a:t>
-            </a:r>
-            <a:r>
-              <a:rPr lang="en-US" b="1" i="1" dirty="0"/>
-              <a:t>heap</a:t>
-            </a:r>
-            <a:r>
-              <a:rPr lang="en-US" dirty="0"/>
-              <a:t>!</a:t>
-            </a:r>
-          </a:p>
-          <a:p>
-            <a:pPr lvl="1"/>
-            <a:r>
-              <a:rPr lang="en-US" dirty="0"/>
-              <a:t>0x6000000</a:t>
-            </a:r>
-          </a:p>
-        </p:txBody>
-      </p:sp>
-      <p:pic>
-        <p:nvPicPr>
-          <p:cNvPr id="11" name="Content Placeholder 10" descr="Uninitialized memory with heap leak">
-            <a:extLst>
-              <a:ext uri="{FF2B5EF4-FFF2-40B4-BE49-F238E27FC236}">
-                <a16:creationId xmlns:a16="http://schemas.microsoft.com/office/drawing/2014/main" id="{4DDE2343-8A55-8347-845E-2BA95940F8FD}"/>
-              </a:ext>
-            </a:extLst>
-          </p:cNvPr>
-          <p:cNvPicPr>
-            <a:picLocks noGrp="1" noChangeAspect="1"/>
-          </p:cNvPicPr>
-          <p:nvPr>
-            <p:ph sz="half" idx="2"/>
-          </p:nvPr>
-        </p:nvPicPr>
-        <p:blipFill>
-          <a:blip r:embed="rId2"/>
-          <a:stretch>
-            <a:fillRect/>
-          </a:stretch>
-        </p:blipFill>
-        <p:spPr>
-          <a:xfrm>
-            <a:off x="707895" y="2296993"/>
-            <a:ext cx="3600440" cy="2026914"/>
-          </a:xfrm>
-        </p:spPr>
-      </p:pic>
-    </p:spTree>
-    <p:extLst>
-      <p:ext uri="{BB962C8B-B14F-4D97-AF65-F5344CB8AC3E}">
-        <p14:creationId xmlns:p14="http://schemas.microsoft.com/office/powerpoint/2010/main" val="2185497818"/>
-      </p:ext>
-    </p:extLst>
-  </p:cSld>
-  <p:clrMapOvr>
-    <a:masterClrMapping/>
-  </p:clrMapOvr>
-</p:sld>
-</file>
-
-<file path=ppt/slides/slide24.xml><?xml version="1.0" encoding="utf-8"?>
-<p:sld xmlns:a="http://schemas.openxmlformats.org/drawingml/2006/main" xmlns:r="http://schemas.openxmlformats.org/officeDocument/2006/relationships" xmlns:p="http://schemas.openxmlformats.org/presentationml/2006/main">
-  <p:cSld>
-    <p:spTree>
-      <p:nvGrpSpPr>
-        <p:cNvPr id="1" name=""/>
-        <p:cNvGrpSpPr/>
-        <p:nvPr/>
-      </p:nvGrpSpPr>
-      <p:grpSpPr>
-        <a:xfrm>
-          <a:off x="0" y="0"/>
-          <a:ext cx="0" cy="0"/>
-          <a:chOff x="0" y="0"/>
-          <a:chExt cx="0" cy="0"/>
-        </a:xfrm>
-      </p:grpSpPr>
-      <p:sp>
-        <p:nvSpPr>
-          <p:cNvPr id="2" name="Title 1">
-            <a:extLst>
-              <a:ext uri="{FF2B5EF4-FFF2-40B4-BE49-F238E27FC236}">
-                <a16:creationId xmlns:a16="http://schemas.microsoft.com/office/drawing/2014/main" id="{B8C87C52-B220-6740-B908-FEFF726E3E8D}"/>
-              </a:ext>
-            </a:extLst>
-          </p:cNvPr>
-          <p:cNvSpPr>
-            <a:spLocks noGrp="1"/>
-          </p:cNvSpPr>
-          <p:nvPr>
-            <p:ph type="title"/>
-          </p:nvPr>
-        </p:nvSpPr>
-        <p:spPr>
-          <a:xfrm>
-            <a:off x="628650" y="273847"/>
-            <a:ext cx="7886700" cy="994172"/>
-          </a:xfrm>
-        </p:spPr>
-        <p:txBody>
-          <a:bodyPr anchor="ctr">
-            <a:normAutofit/>
-          </a:bodyPr>
-          <a:lstStyle/>
-          <a:p>
-            <a:r>
-              <a:rPr lang="en-US" dirty="0"/>
-              <a:t>Use After Free – Read </a:t>
-            </a:r>
-          </a:p>
-        </p:txBody>
-      </p:sp>
-      <p:sp>
-        <p:nvSpPr>
-          <p:cNvPr id="17" name="Text Placeholder 2">
-            <a:extLst>
-              <a:ext uri="{FF2B5EF4-FFF2-40B4-BE49-F238E27FC236}">
-                <a16:creationId xmlns:a16="http://schemas.microsoft.com/office/drawing/2014/main" id="{0D4F255C-3A39-44AF-A10A-EC6EAF6F68BB}"/>
-              </a:ext>
-            </a:extLst>
-          </p:cNvPr>
-          <p:cNvSpPr>
-            <a:spLocks noGrp="1"/>
-          </p:cNvSpPr>
-          <p:nvPr>
-            <p:ph type="body" idx="1"/>
-          </p:nvPr>
-        </p:nvSpPr>
-        <p:spPr>
-          <a:xfrm>
             <a:off x="628650" y="780158"/>
             <a:ext cx="4473786" cy="617934"/>
           </a:xfrm>
@@ -47017,7 +46756,7 @@
 </p:sld>
 </file>
 
-<file path=ppt/slides/slide25.xml><?xml version="1.0" encoding="utf-8"?>
+<file path=ppt/slides/slide24.xml><?xml version="1.0" encoding="utf-8"?>
 <p:sld xmlns:a="http://schemas.openxmlformats.org/drawingml/2006/main" xmlns:r="http://schemas.openxmlformats.org/officeDocument/2006/relationships" xmlns:p="http://schemas.openxmlformats.org/presentationml/2006/main">
   <p:cSld>
     <p:spTree>
@@ -47151,7 +46890,7 @@
 </p:sld>
 </file>
 
-<file path=ppt/slides/slide26.xml><?xml version="1.0" encoding="utf-8"?>
+<file path=ppt/slides/slide25.xml><?xml version="1.0" encoding="utf-8"?>
 <p:sld xmlns:a="http://schemas.openxmlformats.org/drawingml/2006/main" xmlns:r="http://schemas.openxmlformats.org/officeDocument/2006/relationships" xmlns:p="http://schemas.openxmlformats.org/presentationml/2006/main">
   <p:cSld>
     <p:spTree>
@@ -47299,7 +47038,7 @@
 </p:sld>
 </file>
 
-<file path=ppt/slides/slide27.xml><?xml version="1.0" encoding="utf-8"?>
+<file path=ppt/slides/slide26.xml><?xml version="1.0" encoding="utf-8"?>
 <p:sld xmlns:a="http://schemas.openxmlformats.org/drawingml/2006/main" xmlns:r="http://schemas.openxmlformats.org/officeDocument/2006/relationships" xmlns:p="http://schemas.openxmlformats.org/presentationml/2006/main">
   <p:cSld>
     <p:spTree>
@@ -47443,7 +47182,7 @@
 </p:sld>
 </file>
 
-<file path=ppt/slides/slide28.xml><?xml version="1.0" encoding="utf-8"?>
+<file path=ppt/slides/slide27.xml><?xml version="1.0" encoding="utf-8"?>
 <p:sld xmlns:a="http://schemas.openxmlformats.org/drawingml/2006/main" xmlns:r="http://schemas.openxmlformats.org/officeDocument/2006/relationships" xmlns:p="http://schemas.openxmlformats.org/presentationml/2006/main">
   <p:cSld>
     <p:spTree>
@@ -47534,7 +47273,7 @@
 </p:sld>
 </file>
 
-<file path=ppt/slides/slide29.xml><?xml version="1.0" encoding="utf-8"?>
+<file path=ppt/slides/slide28.xml><?xml version="1.0" encoding="utf-8"?>
 <p:sld xmlns:a="http://schemas.openxmlformats.org/drawingml/2006/main" xmlns:r="http://schemas.openxmlformats.org/officeDocument/2006/relationships" xmlns:p="http://schemas.openxmlformats.org/presentationml/2006/main">
   <p:cSld>
     <p:spTree>
@@ -47637,104 +47376,7 @@
 </p:sld>
 </file>
 
-<file path=ppt/slides/slide3.xml><?xml version="1.0" encoding="utf-8"?>
-<p:sld xmlns:a="http://schemas.openxmlformats.org/drawingml/2006/main" xmlns:r="http://schemas.openxmlformats.org/officeDocument/2006/relationships" xmlns:p="http://schemas.openxmlformats.org/presentationml/2006/main">
-  <p:cSld>
-    <p:spTree>
-      <p:nvGrpSpPr>
-        <p:cNvPr id="1" name=""/>
-        <p:cNvGrpSpPr/>
-        <p:nvPr/>
-      </p:nvGrpSpPr>
-      <p:grpSpPr>
-        <a:xfrm>
-          <a:off x="0" y="0"/>
-          <a:ext cx="0" cy="0"/>
-          <a:chOff x="0" y="0"/>
-          <a:chExt cx="0" cy="0"/>
-        </a:xfrm>
-      </p:grpSpPr>
-      <p:sp>
-        <p:nvSpPr>
-          <p:cNvPr id="2" name="Title 1">
-            <a:extLst>
-              <a:ext uri="{FF2B5EF4-FFF2-40B4-BE49-F238E27FC236}">
-                <a16:creationId xmlns:a16="http://schemas.microsoft.com/office/drawing/2014/main" id="{3DD4B9D2-A04D-4F4D-8393-EA4F5F598F72}"/>
-              </a:ext>
-            </a:extLst>
-          </p:cNvPr>
-          <p:cNvSpPr>
-            <a:spLocks noGrp="1"/>
-          </p:cNvSpPr>
-          <p:nvPr>
-            <p:ph type="title"/>
-          </p:nvPr>
-        </p:nvSpPr>
-        <p:spPr>
-          <a:xfrm>
-            <a:off x="628650" y="273844"/>
-            <a:ext cx="7886700" cy="994172"/>
-          </a:xfrm>
-        </p:spPr>
-        <p:txBody>
-          <a:bodyPr anchor="ctr">
-            <a:normAutofit/>
-          </a:bodyPr>
-          <a:lstStyle/>
-          <a:p>
-            <a:r>
-              <a:rPr lang="en-US"/>
-              <a:t>ASLR &amp; PIE</a:t>
-            </a:r>
-            <a:endParaRPr lang="en-US" dirty="0"/>
-          </a:p>
-        </p:txBody>
-      </p:sp>
-      <p:graphicFrame>
-        <p:nvGraphicFramePr>
-          <p:cNvPr id="5" name="Content Placeholder 2">
-            <a:extLst>
-              <a:ext uri="{FF2B5EF4-FFF2-40B4-BE49-F238E27FC236}">
-                <a16:creationId xmlns:a16="http://schemas.microsoft.com/office/drawing/2014/main" id="{E6859918-888A-420F-A039-98CFD2870134}"/>
-              </a:ext>
-            </a:extLst>
-          </p:cNvPr>
-          <p:cNvGraphicFramePr>
-            <a:graphicFrameLocks noGrp="1"/>
-          </p:cNvGraphicFramePr>
-          <p:nvPr>
-            <p:ph idx="1"/>
-            <p:extLst>
-              <p:ext uri="{D42A27DB-BD31-4B8C-83A1-F6EECF244321}">
-                <p14:modId xmlns:p14="http://schemas.microsoft.com/office/powerpoint/2010/main" val="161023322"/>
-              </p:ext>
-            </p:extLst>
-          </p:nvPr>
-        </p:nvGraphicFramePr>
-        <p:xfrm>
-          <a:off x="628650" y="1236541"/>
-          <a:ext cx="7886700" cy="3263504"/>
-        </p:xfrm>
-        <a:graphic>
-          <a:graphicData uri="http://schemas.openxmlformats.org/drawingml/2006/diagram">
-            <dgm:relIds xmlns:dgm="http://schemas.openxmlformats.org/drawingml/2006/diagram" xmlns:r="http://schemas.openxmlformats.org/officeDocument/2006/relationships" r:dm="rId2" r:lo="rId3" r:qs="rId4" r:cs="rId5"/>
-          </a:graphicData>
-        </a:graphic>
-      </p:graphicFrame>
-    </p:spTree>
-    <p:extLst>
-      <p:ext uri="{BB962C8B-B14F-4D97-AF65-F5344CB8AC3E}">
-        <p14:creationId xmlns:p14="http://schemas.microsoft.com/office/powerpoint/2010/main" val="3319657604"/>
-      </p:ext>
-    </p:extLst>
-  </p:cSld>
-  <p:clrMapOvr>
-    <a:masterClrMapping/>
-  </p:clrMapOvr>
-</p:sld>
-</file>
-
-<file path=ppt/slides/slide30.xml><?xml version="1.0" encoding="utf-8"?>
+<file path=ppt/slides/slide29.xml><?xml version="1.0" encoding="utf-8"?>
 <p:sld xmlns:a="http://schemas.openxmlformats.org/drawingml/2006/main" xmlns:r="http://schemas.openxmlformats.org/officeDocument/2006/relationships" xmlns:p="http://schemas.openxmlformats.org/presentationml/2006/main">
   <p:cSld>
     <p:spTree>
@@ -47881,7 +47523,104 @@
 </p:sld>
 </file>
 
-<file path=ppt/slides/slide31.xml><?xml version="1.0" encoding="utf-8"?>
+<file path=ppt/slides/slide3.xml><?xml version="1.0" encoding="utf-8"?>
+<p:sld xmlns:a="http://schemas.openxmlformats.org/drawingml/2006/main" xmlns:r="http://schemas.openxmlformats.org/officeDocument/2006/relationships" xmlns:p="http://schemas.openxmlformats.org/presentationml/2006/main">
+  <p:cSld>
+    <p:spTree>
+      <p:nvGrpSpPr>
+        <p:cNvPr id="1" name=""/>
+        <p:cNvGrpSpPr/>
+        <p:nvPr/>
+      </p:nvGrpSpPr>
+      <p:grpSpPr>
+        <a:xfrm>
+          <a:off x="0" y="0"/>
+          <a:ext cx="0" cy="0"/>
+          <a:chOff x="0" y="0"/>
+          <a:chExt cx="0" cy="0"/>
+        </a:xfrm>
+      </p:grpSpPr>
+      <p:sp>
+        <p:nvSpPr>
+          <p:cNvPr id="2" name="Title 1">
+            <a:extLst>
+              <a:ext uri="{FF2B5EF4-FFF2-40B4-BE49-F238E27FC236}">
+                <a16:creationId xmlns:a16="http://schemas.microsoft.com/office/drawing/2014/main" id="{3DD4B9D2-A04D-4F4D-8393-EA4F5F598F72}"/>
+              </a:ext>
+            </a:extLst>
+          </p:cNvPr>
+          <p:cNvSpPr>
+            <a:spLocks noGrp="1"/>
+          </p:cNvSpPr>
+          <p:nvPr>
+            <p:ph type="title"/>
+          </p:nvPr>
+        </p:nvSpPr>
+        <p:spPr>
+          <a:xfrm>
+            <a:off x="628650" y="273844"/>
+            <a:ext cx="7886700" cy="994172"/>
+          </a:xfrm>
+        </p:spPr>
+        <p:txBody>
+          <a:bodyPr anchor="ctr">
+            <a:normAutofit/>
+          </a:bodyPr>
+          <a:lstStyle/>
+          <a:p>
+            <a:r>
+              <a:rPr lang="en-US"/>
+              <a:t>ASLR &amp; PIE</a:t>
+            </a:r>
+            <a:endParaRPr lang="en-US" dirty="0"/>
+          </a:p>
+        </p:txBody>
+      </p:sp>
+      <p:graphicFrame>
+        <p:nvGraphicFramePr>
+          <p:cNvPr id="5" name="Content Placeholder 2">
+            <a:extLst>
+              <a:ext uri="{FF2B5EF4-FFF2-40B4-BE49-F238E27FC236}">
+                <a16:creationId xmlns:a16="http://schemas.microsoft.com/office/drawing/2014/main" id="{E6859918-888A-420F-A039-98CFD2870134}"/>
+              </a:ext>
+            </a:extLst>
+          </p:cNvPr>
+          <p:cNvGraphicFramePr>
+            <a:graphicFrameLocks noGrp="1"/>
+          </p:cNvGraphicFramePr>
+          <p:nvPr>
+            <p:ph idx="1"/>
+            <p:extLst>
+              <p:ext uri="{D42A27DB-BD31-4B8C-83A1-F6EECF244321}">
+                <p14:modId xmlns:p14="http://schemas.microsoft.com/office/powerpoint/2010/main" val="161023322"/>
+              </p:ext>
+            </p:extLst>
+          </p:nvPr>
+        </p:nvGraphicFramePr>
+        <p:xfrm>
+          <a:off x="628650" y="1236541"/>
+          <a:ext cx="7886700" cy="3263504"/>
+        </p:xfrm>
+        <a:graphic>
+          <a:graphicData uri="http://schemas.openxmlformats.org/drawingml/2006/diagram">
+            <dgm:relIds xmlns:dgm="http://schemas.openxmlformats.org/drawingml/2006/diagram" xmlns:r="http://schemas.openxmlformats.org/officeDocument/2006/relationships" r:dm="rId2" r:lo="rId3" r:qs="rId4" r:cs="rId5"/>
+          </a:graphicData>
+        </a:graphic>
+      </p:graphicFrame>
+    </p:spTree>
+    <p:extLst>
+      <p:ext uri="{BB962C8B-B14F-4D97-AF65-F5344CB8AC3E}">
+        <p14:creationId xmlns:p14="http://schemas.microsoft.com/office/powerpoint/2010/main" val="3319657604"/>
+      </p:ext>
+    </p:extLst>
+  </p:cSld>
+  <p:clrMapOvr>
+    <a:masterClrMapping/>
+  </p:clrMapOvr>
+</p:sld>
+</file>
+
+<file path=ppt/slides/slide30.xml><?xml version="1.0" encoding="utf-8"?>
 <p:sld xmlns:a="http://schemas.openxmlformats.org/drawingml/2006/main" xmlns:r="http://schemas.openxmlformats.org/officeDocument/2006/relationships" xmlns:p="http://schemas.openxmlformats.org/presentationml/2006/main">
   <p:cSld>
     <p:spTree>
@@ -47981,7 +47720,7 @@
 </p:sld>
 </file>
 
-<file path=ppt/slides/slide32.xml><?xml version="1.0" encoding="utf-8"?>
+<file path=ppt/slides/slide31.xml><?xml version="1.0" encoding="utf-8"?>
 <p:sld xmlns:a="http://schemas.openxmlformats.org/drawingml/2006/main" xmlns:r="http://schemas.openxmlformats.org/officeDocument/2006/relationships" xmlns:p="http://schemas.openxmlformats.org/presentationml/2006/main">
   <p:cSld>
     <p:spTree>
@@ -48382,7 +48121,7 @@
 </p:sld>
 </file>
 
-<file path=ppt/slides/slide33.xml><?xml version="1.0" encoding="utf-8"?>
+<file path=ppt/slides/slide32.xml><?xml version="1.0" encoding="utf-8"?>
 <p:sld xmlns:a="http://schemas.openxmlformats.org/drawingml/2006/main" xmlns:r="http://schemas.openxmlformats.org/officeDocument/2006/relationships" xmlns:p="http://schemas.openxmlformats.org/presentationml/2006/main">
   <p:cSld>
     <p:spTree>
@@ -48646,7 +48385,7 @@
 </p:sld>
 </file>
 
-<file path=ppt/slides/slide34.xml><?xml version="1.0" encoding="utf-8"?>
+<file path=ppt/slides/slide33.xml><?xml version="1.0" encoding="utf-8"?>
 <p:sld xmlns:a="http://schemas.openxmlformats.org/drawingml/2006/main" xmlns:r="http://schemas.openxmlformats.org/officeDocument/2006/relationships" xmlns:p="http://schemas.openxmlformats.org/presentationml/2006/main">
   <p:cSld>
     <p:spTree>
@@ -48714,7 +48453,7 @@
             <p:ph idx="1"/>
             <p:extLst>
               <p:ext uri="{D42A27DB-BD31-4B8C-83A1-F6EECF244321}">
-                <p14:modId xmlns:p14="http://schemas.microsoft.com/office/powerpoint/2010/main" val="945228541"/>
+                <p14:modId xmlns:p14="http://schemas.microsoft.com/office/powerpoint/2010/main" val="1765636753"/>
               </p:ext>
             </p:extLst>
           </p:nvPr>
@@ -48742,7 +48481,7 @@
 </p:sld>
 </file>
 
-<file path=ppt/slides/slide35.xml><?xml version="1.0" encoding="utf-8"?>
+<file path=ppt/slides/slide34.xml><?xml version="1.0" encoding="utf-8"?>
 <p:sld xmlns:a="http://schemas.openxmlformats.org/drawingml/2006/main" xmlns:r="http://schemas.openxmlformats.org/officeDocument/2006/relationships" xmlns:p="http://schemas.openxmlformats.org/presentationml/2006/main">
   <p:cSld>
     <p:spTree>
@@ -48829,6 +48568,148 @@
     <p:extLst>
       <p:ext uri="{BB962C8B-B14F-4D97-AF65-F5344CB8AC3E}">
         <p14:creationId xmlns:p14="http://schemas.microsoft.com/office/powerpoint/2010/main" val="2564856961"/>
+      </p:ext>
+    </p:extLst>
+  </p:cSld>
+  <p:clrMapOvr>
+    <a:masterClrMapping/>
+  </p:clrMapOvr>
+</p:sld>
+</file>
+
+<file path=ppt/slides/slide35.xml><?xml version="1.0" encoding="utf-8"?>
+<p:sld xmlns:a="http://schemas.openxmlformats.org/drawingml/2006/main" xmlns:r="http://schemas.openxmlformats.org/officeDocument/2006/relationships" xmlns:p="http://schemas.openxmlformats.org/presentationml/2006/main">
+  <p:cSld>
+    <p:spTree>
+      <p:nvGrpSpPr>
+        <p:cNvPr id="1" name=""/>
+        <p:cNvGrpSpPr/>
+        <p:nvPr/>
+      </p:nvGrpSpPr>
+      <p:grpSpPr>
+        <a:xfrm>
+          <a:off x="0" y="0"/>
+          <a:ext cx="0" cy="0"/>
+          <a:chOff x="0" y="0"/>
+          <a:chExt cx="0" cy="0"/>
+        </a:xfrm>
+      </p:grpSpPr>
+      <p:sp>
+        <p:nvSpPr>
+          <p:cNvPr id="2" name="Title 1">
+            <a:extLst>
+              <a:ext uri="{FF2B5EF4-FFF2-40B4-BE49-F238E27FC236}">
+                <a16:creationId xmlns:a16="http://schemas.microsoft.com/office/drawing/2014/main" id="{6AA5F91A-B48A-9D4D-B2B1-7D27873B4C58}"/>
+              </a:ext>
+            </a:extLst>
+          </p:cNvPr>
+          <p:cNvSpPr>
+            <a:spLocks noGrp="1"/>
+          </p:cNvSpPr>
+          <p:nvPr>
+            <p:ph type="title"/>
+          </p:nvPr>
+        </p:nvSpPr>
+        <p:spPr>
+          <a:xfrm>
+            <a:off x="628650" y="273847"/>
+            <a:ext cx="7886700" cy="994172"/>
+          </a:xfrm>
+        </p:spPr>
+        <p:txBody>
+          <a:bodyPr anchor="ctr">
+            <a:normAutofit/>
+          </a:bodyPr>
+          <a:lstStyle/>
+          <a:p>
+            <a:r>
+              <a:rPr lang="en-US" dirty="0"/>
+              <a:t>Heap Feng Shui – Example 1 </a:t>
+            </a:r>
+          </a:p>
+        </p:txBody>
+      </p:sp>
+      <p:pic>
+        <p:nvPicPr>
+          <p:cNvPr id="5" name="Content Placeholder 4" descr="List of 5 integers">
+            <a:extLst>
+              <a:ext uri="{FF2B5EF4-FFF2-40B4-BE49-F238E27FC236}">
+                <a16:creationId xmlns:a16="http://schemas.microsoft.com/office/drawing/2014/main" id="{538FC045-E9A2-3448-969C-59377C4D3DD5}"/>
+              </a:ext>
+            </a:extLst>
+          </p:cNvPr>
+          <p:cNvPicPr>
+            <a:picLocks noGrp="1" noChangeAspect="1"/>
+          </p:cNvPicPr>
+          <p:nvPr>
+            <p:ph sz="half" idx="1"/>
+          </p:nvPr>
+        </p:nvPicPr>
+        <p:blipFill>
+          <a:blip r:embed="rId2"/>
+          <a:stretch>
+            <a:fillRect/>
+          </a:stretch>
+        </p:blipFill>
+        <p:spPr>
+          <a:xfrm>
+            <a:off x="4931734" y="1369219"/>
+            <a:ext cx="3886200" cy="3177877"/>
+          </a:xfrm>
+          <a:noFill/>
+        </p:spPr>
+      </p:pic>
+      <p:sp>
+        <p:nvSpPr>
+          <p:cNvPr id="10" name="Content Placeholder 3">
+            <a:extLst>
+              <a:ext uri="{FF2B5EF4-FFF2-40B4-BE49-F238E27FC236}">
+                <a16:creationId xmlns:a16="http://schemas.microsoft.com/office/drawing/2014/main" id="{42859FAB-CB8D-4501-A6FC-C1137E8A24FC}"/>
+              </a:ext>
+            </a:extLst>
+          </p:cNvPr>
+          <p:cNvSpPr>
+            <a:spLocks noGrp="1"/>
+          </p:cNvSpPr>
+          <p:nvPr>
+            <p:ph sz="half" idx="2"/>
+          </p:nvPr>
+        </p:nvSpPr>
+        <p:spPr>
+          <a:xfrm>
+            <a:off x="539288" y="1369219"/>
+            <a:ext cx="4188785" cy="3263504"/>
+          </a:xfrm>
+        </p:spPr>
+        <p:txBody>
+          <a:bodyPr/>
+          <a:lstStyle/>
+          <a:p>
+            <a:r>
+              <a:rPr lang="en-US" dirty="0"/>
+              <a:t>How could heap feng shui help with an OOB read? </a:t>
+            </a:r>
+          </a:p>
+          <a:p>
+            <a:r>
+              <a:rPr lang="en-US" dirty="0"/>
+              <a:t>Put a heap chunk pointer directly </a:t>
+            </a:r>
+            <a:r>
+              <a:rPr lang="en-US" b="1" i="1" dirty="0"/>
+              <a:t>after</a:t>
+            </a:r>
+            <a:r>
+              <a:rPr lang="en-US" dirty="0"/>
+              <a:t> the list of integers</a:t>
+            </a:r>
+          </a:p>
+        </p:txBody>
+      </p:sp>
+    </p:spTree>
+    <p:extLst>
+      <p:ext uri="{BB962C8B-B14F-4D97-AF65-F5344CB8AC3E}">
+        <p14:creationId xmlns:p14="http://schemas.microsoft.com/office/powerpoint/2010/main" val="2517299448"/>
       </p:ext>
     </p:extLst>
   </p:cSld>
@@ -49077,11 +48958,72 @@
           <a:p>
             <a:r>
               <a:rPr lang="en-US" dirty="0"/>
-              <a:t>Use after free example to leak something</a:t>
+              <a:t>What if we needed a </a:t>
+            </a:r>
+            <a:r>
+              <a:rPr lang="en-US" dirty="0" err="1"/>
+              <a:t>LibC</a:t>
+            </a:r>
+            <a:r>
+              <a:rPr lang="en-US" dirty="0"/>
+              <a:t> Leak?</a:t>
+            </a:r>
+          </a:p>
+          <a:p>
+            <a:r>
+              <a:rPr lang="en-US" dirty="0"/>
+              <a:t>Let’s assume we have a use after free (UAF) on a heap chunk of any size we want.</a:t>
             </a:r>
           </a:p>
         </p:txBody>
       </p:sp>
+      <p:pic>
+        <p:nvPicPr>
+          <p:cNvPr id="1026" name="Picture 2">
+            <a:extLst>
+              <a:ext uri="{FF2B5EF4-FFF2-40B4-BE49-F238E27FC236}">
+                <a16:creationId xmlns:a16="http://schemas.microsoft.com/office/drawing/2014/main" id="{109AB0EB-B0A3-A544-B12B-9849ED33E2B5}"/>
+              </a:ext>
+            </a:extLst>
+          </p:cNvPr>
+          <p:cNvPicPr>
+            <a:picLocks noChangeAspect="1" noChangeArrowheads="1"/>
+          </p:cNvPicPr>
+          <p:nvPr/>
+        </p:nvPicPr>
+        <p:blipFill>
+          <a:blip r:embed="rId2">
+            <a:extLst>
+              <a:ext uri="{28A0092B-C50C-407E-A947-70E740481C1C}">
+                <a14:useLocalDpi xmlns:a14="http://schemas.microsoft.com/office/drawing/2010/main" val="0"/>
+              </a:ext>
+            </a:extLst>
+          </a:blip>
+          <a:srcRect/>
+          <a:stretch>
+            <a:fillRect/>
+          </a:stretch>
+        </p:blipFill>
+        <p:spPr bwMode="auto">
+          <a:xfrm>
+            <a:off x="6299754" y="1268019"/>
+            <a:ext cx="2473124" cy="3263504"/>
+          </a:xfrm>
+          <a:prstGeom prst="rect">
+            <a:avLst/>
+          </a:prstGeom>
+          <a:noFill/>
+          <a:extLst>
+            <a:ext uri="{909E8E84-426E-40DD-AFC4-6F175D3DCCD1}">
+              <a14:hiddenFill xmlns:a14="http://schemas.microsoft.com/office/drawing/2010/main">
+                <a:solidFill>
+                  <a:srgbClr val="FFFFFF"/>
+                </a:solidFill>
+              </a14:hiddenFill>
+            </a:ext>
+          </a:extLst>
+        </p:spPr>
+      </p:pic>
     </p:spTree>
     <p:extLst>
       <p:ext uri="{BB962C8B-B14F-4D97-AF65-F5344CB8AC3E}">
@@ -49096,6 +49038,529 @@
 </file>
 
 <file path=ppt/slides/slide38.xml><?xml version="1.0" encoding="utf-8"?>
+<p:sld xmlns:a="http://schemas.openxmlformats.org/drawingml/2006/main" xmlns:r="http://schemas.openxmlformats.org/officeDocument/2006/relationships" xmlns:p="http://schemas.openxmlformats.org/presentationml/2006/main">
+  <p:cSld>
+    <p:spTree>
+      <p:nvGrpSpPr>
+        <p:cNvPr id="1" name=""/>
+        <p:cNvGrpSpPr/>
+        <p:nvPr/>
+      </p:nvGrpSpPr>
+      <p:grpSpPr>
+        <a:xfrm>
+          <a:off x="0" y="0"/>
+          <a:ext cx="0" cy="0"/>
+          <a:chOff x="0" y="0"/>
+          <a:chExt cx="0" cy="0"/>
+        </a:xfrm>
+      </p:grpSpPr>
+      <p:sp>
+        <p:nvSpPr>
+          <p:cNvPr id="2" name="Title 1">
+            <a:extLst>
+              <a:ext uri="{FF2B5EF4-FFF2-40B4-BE49-F238E27FC236}">
+                <a16:creationId xmlns:a16="http://schemas.microsoft.com/office/drawing/2014/main" id="{3F16B072-C536-A340-92FB-F581F589305A}"/>
+              </a:ext>
+            </a:extLst>
+          </p:cNvPr>
+          <p:cNvSpPr>
+            <a:spLocks noGrp="1"/>
+          </p:cNvSpPr>
+          <p:nvPr>
+            <p:ph type="title"/>
+          </p:nvPr>
+        </p:nvSpPr>
+        <p:spPr>
+          <a:xfrm>
+            <a:off x="628650" y="273847"/>
+            <a:ext cx="7886700" cy="994172"/>
+          </a:xfrm>
+        </p:spPr>
+        <p:txBody>
+          <a:bodyPr anchor="ctr">
+            <a:normAutofit/>
+          </a:bodyPr>
+          <a:lstStyle/>
+          <a:p>
+            <a:r>
+              <a:rPr lang="en-US" dirty="0"/>
+              <a:t>Heap Feng Shui – Example 2 </a:t>
+            </a:r>
+          </a:p>
+        </p:txBody>
+      </p:sp>
+      <p:pic>
+        <p:nvPicPr>
+          <p:cNvPr id="5" name="Content Placeholder 9" descr="TCache bin heap chunk">
+            <a:extLst>
+              <a:ext uri="{FF2B5EF4-FFF2-40B4-BE49-F238E27FC236}">
+                <a16:creationId xmlns:a16="http://schemas.microsoft.com/office/drawing/2014/main" id="{27854CA1-4541-2C42-A39E-D7B2F40E842F}"/>
+              </a:ext>
+            </a:extLst>
+          </p:cNvPr>
+          <p:cNvPicPr>
+            <a:picLocks noGrp="1" noChangeAspect="1"/>
+          </p:cNvPicPr>
+          <p:nvPr>
+            <p:ph sz="half" idx="1"/>
+          </p:nvPr>
+        </p:nvPicPr>
+        <p:blipFill>
+          <a:blip r:embed="rId2"/>
+          <a:stretch>
+            <a:fillRect/>
+          </a:stretch>
+        </p:blipFill>
+        <p:spPr>
+          <a:xfrm>
+            <a:off x="628650" y="1571363"/>
+            <a:ext cx="3886200" cy="2859216"/>
+          </a:xfrm>
+          <a:noFill/>
+        </p:spPr>
+      </p:pic>
+      <p:sp>
+        <p:nvSpPr>
+          <p:cNvPr id="3" name="Content Placeholder 2">
+            <a:extLst>
+              <a:ext uri="{FF2B5EF4-FFF2-40B4-BE49-F238E27FC236}">
+                <a16:creationId xmlns:a16="http://schemas.microsoft.com/office/drawing/2014/main" id="{509FE750-EE36-174E-B5C9-5186E08F9798}"/>
+              </a:ext>
+            </a:extLst>
+          </p:cNvPr>
+          <p:cNvSpPr>
+            <a:spLocks noGrp="1"/>
+          </p:cNvSpPr>
+          <p:nvPr>
+            <p:ph sz="half" idx="2"/>
+          </p:nvPr>
+        </p:nvSpPr>
+        <p:spPr>
+          <a:xfrm>
+            <a:off x="4629150" y="1369219"/>
+            <a:ext cx="3886200" cy="3263504"/>
+          </a:xfrm>
+        </p:spPr>
+        <p:txBody>
+          <a:bodyPr>
+            <a:normAutofit/>
+          </a:bodyPr>
+          <a:lstStyle/>
+          <a:p>
+            <a:r>
+              <a:rPr lang="en-US" dirty="0"/>
+              <a:t>Is it possible to setup chunks that we leak a pointer to </a:t>
+            </a:r>
+            <a:r>
+              <a:rPr lang="en-US" dirty="0" err="1"/>
+              <a:t>LibC</a:t>
+            </a:r>
+            <a:r>
+              <a:rPr lang="en-US" dirty="0"/>
+              <a:t>?</a:t>
+            </a:r>
+          </a:p>
+          <a:p>
+            <a:r>
+              <a:rPr lang="en-US" dirty="0"/>
+              <a:t>This current setup leaks the heap, not </a:t>
+            </a:r>
+            <a:r>
+              <a:rPr lang="en-US" dirty="0" err="1"/>
+              <a:t>LibC</a:t>
+            </a:r>
+            <a:endParaRPr lang="en-US" dirty="0"/>
+          </a:p>
+          <a:p>
+            <a:endParaRPr lang="en-US" dirty="0"/>
+          </a:p>
+          <a:p>
+            <a:endParaRPr lang="en-US" dirty="0"/>
+          </a:p>
+          <a:p>
+            <a:r>
+              <a:rPr lang="en-US" dirty="0"/>
+              <a:t>My heap pointer</a:t>
+            </a:r>
+          </a:p>
+        </p:txBody>
+      </p:sp>
+      <p:cxnSp>
+        <p:nvCxnSpPr>
+          <p:cNvPr id="7" name="Straight Arrow Connector 6">
+            <a:extLst>
+              <a:ext uri="{FF2B5EF4-FFF2-40B4-BE49-F238E27FC236}">
+                <a16:creationId xmlns:a16="http://schemas.microsoft.com/office/drawing/2014/main" id="{6BB80154-DC1D-594C-8667-FA5E30CF0A17}"/>
+              </a:ext>
+            </a:extLst>
+          </p:cNvPr>
+          <p:cNvCxnSpPr>
+            <a:cxnSpLocks/>
+          </p:cNvCxnSpPr>
+          <p:nvPr/>
+        </p:nvCxnSpPr>
+        <p:spPr>
+          <a:xfrm flipH="1" flipV="1">
+            <a:off x="2121764" y="2929630"/>
+            <a:ext cx="2592279" cy="1349407"/>
+          </a:xfrm>
+          <a:prstGeom prst="straightConnector1">
+            <a:avLst/>
+          </a:prstGeom>
+          <a:ln w="57150">
+            <a:solidFill>
+              <a:srgbClr val="FF0000"/>
+            </a:solidFill>
+            <a:tailEnd type="triangle"/>
+          </a:ln>
+        </p:spPr>
+        <p:style>
+          <a:lnRef idx="1">
+            <a:schemeClr val="accent1"/>
+          </a:lnRef>
+          <a:fillRef idx="0">
+            <a:schemeClr val="accent1"/>
+          </a:fillRef>
+          <a:effectRef idx="0">
+            <a:schemeClr val="accent1"/>
+          </a:effectRef>
+          <a:fontRef idx="minor">
+            <a:schemeClr val="tx1"/>
+          </a:fontRef>
+        </p:style>
+      </p:cxnSp>
+    </p:spTree>
+    <p:extLst>
+      <p:ext uri="{BB962C8B-B14F-4D97-AF65-F5344CB8AC3E}">
+        <p14:creationId xmlns:p14="http://schemas.microsoft.com/office/powerpoint/2010/main" val="2656089208"/>
+      </p:ext>
+    </p:extLst>
+  </p:cSld>
+  <p:clrMapOvr>
+    <a:masterClrMapping/>
+  </p:clrMapOvr>
+</p:sld>
+</file>
+
+<file path=ppt/slides/slide39.xml><?xml version="1.0" encoding="utf-8"?>
+<p:sld xmlns:a="http://schemas.openxmlformats.org/drawingml/2006/main" xmlns:r="http://schemas.openxmlformats.org/officeDocument/2006/relationships" xmlns:p="http://schemas.openxmlformats.org/presentationml/2006/main">
+  <p:cSld>
+    <p:spTree>
+      <p:nvGrpSpPr>
+        <p:cNvPr id="1" name=""/>
+        <p:cNvGrpSpPr/>
+        <p:nvPr/>
+      </p:nvGrpSpPr>
+      <p:grpSpPr>
+        <a:xfrm>
+          <a:off x="0" y="0"/>
+          <a:ext cx="0" cy="0"/>
+          <a:chOff x="0" y="0"/>
+          <a:chExt cx="0" cy="0"/>
+        </a:xfrm>
+      </p:grpSpPr>
+      <p:sp>
+        <p:nvSpPr>
+          <p:cNvPr id="2" name="Title 1">
+            <a:extLst>
+              <a:ext uri="{FF2B5EF4-FFF2-40B4-BE49-F238E27FC236}">
+                <a16:creationId xmlns:a16="http://schemas.microsoft.com/office/drawing/2014/main" id="{C5BAB3BC-0680-F14D-86BA-C542BCB2DA2A}"/>
+              </a:ext>
+            </a:extLst>
+          </p:cNvPr>
+          <p:cNvSpPr>
+            <a:spLocks noGrp="1"/>
+          </p:cNvSpPr>
+          <p:nvPr>
+            <p:ph type="title"/>
+          </p:nvPr>
+        </p:nvSpPr>
+        <p:spPr>
+          <a:xfrm>
+            <a:off x="629841" y="342900"/>
+            <a:ext cx="2949178" cy="1200150"/>
+          </a:xfrm>
+        </p:spPr>
+        <p:txBody>
+          <a:bodyPr anchor="b">
+            <a:normAutofit fontScale="90000"/>
+          </a:bodyPr>
+          <a:lstStyle/>
+          <a:p>
+            <a:r>
+              <a:rPr lang="en-US" dirty="0"/>
+              <a:t>Heap Feng Shui – Example 2</a:t>
+            </a:r>
+          </a:p>
+        </p:txBody>
+      </p:sp>
+      <p:pic>
+        <p:nvPicPr>
+          <p:cNvPr id="9" name="Content Placeholder 8" descr="Unsorted">
+            <a:extLst>
+              <a:ext uri="{FF2B5EF4-FFF2-40B4-BE49-F238E27FC236}">
+                <a16:creationId xmlns:a16="http://schemas.microsoft.com/office/drawing/2014/main" id="{77012BAA-0C24-5E4E-B765-F29B66013CA0}"/>
+              </a:ext>
+            </a:extLst>
+          </p:cNvPr>
+          <p:cNvPicPr>
+            <a:picLocks noGrp="1" noChangeAspect="1"/>
+          </p:cNvPicPr>
+          <p:nvPr>
+            <p:ph idx="1"/>
+          </p:nvPr>
+        </p:nvPicPr>
+        <p:blipFill>
+          <a:blip r:embed="rId2"/>
+          <a:stretch>
+            <a:fillRect/>
+          </a:stretch>
+        </p:blipFill>
+        <p:spPr>
+          <a:xfrm>
+            <a:off x="3887391" y="1282306"/>
+            <a:ext cx="4629150" cy="2571750"/>
+          </a:xfrm>
+          <a:noFill/>
+        </p:spPr>
+      </p:pic>
+      <p:sp>
+        <p:nvSpPr>
+          <p:cNvPr id="10" name="Text Placeholder 3">
+            <a:extLst>
+              <a:ext uri="{FF2B5EF4-FFF2-40B4-BE49-F238E27FC236}">
+                <a16:creationId xmlns:a16="http://schemas.microsoft.com/office/drawing/2014/main" id="{C640A016-A403-4ABE-9AB7-5D5BA7AF540C}"/>
+              </a:ext>
+            </a:extLst>
+          </p:cNvPr>
+          <p:cNvSpPr>
+            <a:spLocks noGrp="1"/>
+          </p:cNvSpPr>
+          <p:nvPr>
+            <p:ph type="body" sz="half" idx="2"/>
+          </p:nvPr>
+        </p:nvSpPr>
+        <p:spPr>
+          <a:xfrm>
+            <a:off x="629841" y="1543052"/>
+            <a:ext cx="2949178" cy="2858691"/>
+          </a:xfrm>
+        </p:spPr>
+        <p:txBody>
+          <a:bodyPr>
+            <a:normAutofit/>
+          </a:bodyPr>
+          <a:lstStyle/>
+          <a:p>
+            <a:r>
+              <a:rPr lang="en-US" dirty="0"/>
+              <a:t>Front of unsorted bin </a:t>
+            </a:r>
+            <a:r>
+              <a:rPr lang="en-US" b="1" i="1" dirty="0"/>
+              <a:t>fd</a:t>
+            </a:r>
+            <a:r>
+              <a:rPr lang="en-US" dirty="0"/>
+              <a:t> or back of unsorted bin </a:t>
+            </a:r>
+            <a:r>
+              <a:rPr lang="en-US" b="1" i="1" dirty="0"/>
+              <a:t>bk</a:t>
+            </a:r>
+            <a:r>
+              <a:rPr lang="en-US" dirty="0"/>
+              <a:t> point to the bin </a:t>
+            </a:r>
+          </a:p>
+          <a:p>
+            <a:r>
+              <a:rPr lang="en-US" dirty="0"/>
+              <a:t>The bin itself stored within </a:t>
+            </a:r>
+            <a:r>
+              <a:rPr lang="en-US" dirty="0" err="1"/>
+              <a:t>LibC</a:t>
+            </a:r>
+            <a:r>
+              <a:rPr lang="en-US" dirty="0"/>
+              <a:t>!</a:t>
+            </a:r>
+          </a:p>
+          <a:p>
+            <a:r>
+              <a:rPr lang="en-US" dirty="0"/>
+              <a:t>The first or last chunk in the unsorted bin will leak </a:t>
+            </a:r>
+            <a:r>
+              <a:rPr lang="en-US" dirty="0" err="1"/>
+              <a:t>LibC’s</a:t>
+            </a:r>
+            <a:r>
+              <a:rPr lang="en-US" dirty="0"/>
+              <a:t> address :) </a:t>
+            </a:r>
+          </a:p>
+          <a:p>
+            <a:endParaRPr lang="en-US" dirty="0"/>
+          </a:p>
+          <a:p>
+            <a:r>
+              <a:rPr lang="en-US" dirty="0"/>
+              <a:t>My heap pointer</a:t>
+            </a:r>
+          </a:p>
+        </p:txBody>
+      </p:sp>
+      <p:cxnSp>
+        <p:nvCxnSpPr>
+          <p:cNvPr id="11" name="Straight Arrow Connector 10">
+            <a:extLst>
+              <a:ext uri="{FF2B5EF4-FFF2-40B4-BE49-F238E27FC236}">
+                <a16:creationId xmlns:a16="http://schemas.microsoft.com/office/drawing/2014/main" id="{04259349-F609-F746-9FC8-35B19D86533F}"/>
+              </a:ext>
+            </a:extLst>
+          </p:cNvPr>
+          <p:cNvCxnSpPr>
+            <a:cxnSpLocks/>
+          </p:cNvCxnSpPr>
+          <p:nvPr/>
+        </p:nvCxnSpPr>
+        <p:spPr>
+          <a:xfrm flipV="1">
+            <a:off x="2263806" y="2636668"/>
+            <a:ext cx="2183907" cy="1535837"/>
+          </a:xfrm>
+          <a:prstGeom prst="straightConnector1">
+            <a:avLst/>
+          </a:prstGeom>
+          <a:ln w="57150">
+            <a:solidFill>
+              <a:srgbClr val="FF0000"/>
+            </a:solidFill>
+            <a:tailEnd type="triangle"/>
+          </a:ln>
+        </p:spPr>
+        <p:style>
+          <a:lnRef idx="1">
+            <a:schemeClr val="accent1"/>
+          </a:lnRef>
+          <a:fillRef idx="0">
+            <a:schemeClr val="accent1"/>
+          </a:fillRef>
+          <a:effectRef idx="0">
+            <a:schemeClr val="accent1"/>
+          </a:effectRef>
+          <a:fontRef idx="minor">
+            <a:schemeClr val="tx1"/>
+          </a:fontRef>
+        </p:style>
+      </p:cxnSp>
+    </p:spTree>
+    <p:extLst>
+      <p:ext uri="{BB962C8B-B14F-4D97-AF65-F5344CB8AC3E}">
+        <p14:creationId xmlns:p14="http://schemas.microsoft.com/office/powerpoint/2010/main" val="3701776134"/>
+      </p:ext>
+    </p:extLst>
+  </p:cSld>
+  <p:clrMapOvr>
+    <a:masterClrMapping/>
+  </p:clrMapOvr>
+</p:sld>
+</file>
+
+<file path=ppt/slides/slide4.xml><?xml version="1.0" encoding="utf-8"?>
+<p:sld xmlns:a="http://schemas.openxmlformats.org/drawingml/2006/main" xmlns:r="http://schemas.openxmlformats.org/officeDocument/2006/relationships" xmlns:p="http://schemas.openxmlformats.org/presentationml/2006/main">
+  <p:cSld>
+    <p:spTree>
+      <p:nvGrpSpPr>
+        <p:cNvPr id="1" name=""/>
+        <p:cNvGrpSpPr/>
+        <p:nvPr/>
+      </p:nvGrpSpPr>
+      <p:grpSpPr>
+        <a:xfrm>
+          <a:off x="0" y="0"/>
+          <a:ext cx="0" cy="0"/>
+          <a:chOff x="0" y="0"/>
+          <a:chExt cx="0" cy="0"/>
+        </a:xfrm>
+      </p:grpSpPr>
+      <p:sp>
+        <p:nvSpPr>
+          <p:cNvPr id="2" name="Title 1">
+            <a:extLst>
+              <a:ext uri="{FF2B5EF4-FFF2-40B4-BE49-F238E27FC236}">
+                <a16:creationId xmlns:a16="http://schemas.microsoft.com/office/drawing/2014/main" id="{1BDD0254-2F5D-5D4C-A0D7-2421174D5BB2}"/>
+              </a:ext>
+            </a:extLst>
+          </p:cNvPr>
+          <p:cNvSpPr>
+            <a:spLocks noGrp="1"/>
+          </p:cNvSpPr>
+          <p:nvPr>
+            <p:ph type="title"/>
+          </p:nvPr>
+        </p:nvSpPr>
+        <p:spPr>
+          <a:xfrm>
+            <a:off x="898636" y="125980"/>
+            <a:ext cx="7491124" cy="1126229"/>
+          </a:xfrm>
+        </p:spPr>
+        <p:txBody>
+          <a:bodyPr anchor="b">
+            <a:normAutofit fontScale="90000"/>
+          </a:bodyPr>
+          <a:lstStyle/>
+          <a:p>
+            <a:r>
+              <a:rPr lang="en-US"/>
+              <a:t>Address Space Layout Randomization (ASLR)</a:t>
+            </a:r>
+          </a:p>
+        </p:txBody>
+      </p:sp>
+      <p:graphicFrame>
+        <p:nvGraphicFramePr>
+          <p:cNvPr id="97" name="Content Placeholder 2">
+            <a:extLst>
+              <a:ext uri="{FF2B5EF4-FFF2-40B4-BE49-F238E27FC236}">
+                <a16:creationId xmlns:a16="http://schemas.microsoft.com/office/drawing/2014/main" id="{C57EF78C-8440-4A73-84EF-EBEAEE1365C9}"/>
+              </a:ext>
+            </a:extLst>
+          </p:cNvPr>
+          <p:cNvGraphicFramePr>
+            <a:graphicFrameLocks noGrp="1"/>
+          </p:cNvGraphicFramePr>
+          <p:nvPr>
+            <p:ph idx="1"/>
+          </p:nvPr>
+        </p:nvGraphicFramePr>
+        <p:xfrm>
+          <a:off x="628650" y="1486626"/>
+          <a:ext cx="7886700" cy="3146096"/>
+        </p:xfrm>
+        <a:graphic>
+          <a:graphicData uri="http://schemas.openxmlformats.org/drawingml/2006/diagram">
+            <dgm:relIds xmlns:dgm="http://schemas.openxmlformats.org/drawingml/2006/diagram" xmlns:r="http://schemas.openxmlformats.org/officeDocument/2006/relationships" r:dm="rId2" r:lo="rId3" r:qs="rId4" r:cs="rId5"/>
+          </a:graphicData>
+        </a:graphic>
+      </p:graphicFrame>
+    </p:spTree>
+    <p:extLst>
+      <p:ext uri="{BB962C8B-B14F-4D97-AF65-F5344CB8AC3E}">
+        <p14:creationId xmlns:p14="http://schemas.microsoft.com/office/powerpoint/2010/main" val="1628456243"/>
+      </p:ext>
+    </p:extLst>
+  </p:cSld>
+  <p:clrMapOvr>
+    <a:masterClrMapping/>
+  </p:clrMapOvr>
+</p:sld>
+</file>
+
+<file path=ppt/slides/slide40.xml><?xml version="1.0" encoding="utf-8"?>
 <p:sld xmlns:a="http://schemas.openxmlformats.org/drawingml/2006/main" xmlns:r="http://schemas.openxmlformats.org/officeDocument/2006/relationships" xmlns:p="http://schemas.openxmlformats.org/presentationml/2006/main">
   <p:cSld>
     <p:spTree>
@@ -49272,15 +49737,6 @@
           <a:solidFill>
             <a:srgbClr val="FFFFFF"/>
           </a:solidFill>
-          <a:extLst>
-            <a:ext uri="{909E8E84-426E-40DD-AFC4-6F175D3DCCD1}">
-              <a14:hiddenFill xmlns:a14="http://schemas.microsoft.com/office/drawing/2010/main">
-                <a:solidFill>
-                  <a:srgbClr val="FFFFFF"/>
-                </a:solidFill>
-              </a14:hiddenFill>
-            </a:ext>
-          </a:extLst>
         </p:spPr>
       </p:pic>
     </p:spTree>
@@ -49296,7 +49752,7 @@
 </p:sld>
 </file>
 
-<file path=ppt/slides/slide39.xml><?xml version="1.0" encoding="utf-8"?>
+<file path=ppt/slides/slide41.xml><?xml version="1.0" encoding="utf-8"?>
 <p:sld xmlns:a="http://schemas.openxmlformats.org/drawingml/2006/main" xmlns:r="http://schemas.openxmlformats.org/officeDocument/2006/relationships" xmlns:p="http://schemas.openxmlformats.org/presentationml/2006/main">
   <p:cSld>
     <p:spTree>
@@ -49318,7 +49774,7 @@
           <p:cNvPr id="2" name="Title 1">
             <a:extLst>
               <a:ext uri="{FF2B5EF4-FFF2-40B4-BE49-F238E27FC236}">
-                <a16:creationId xmlns:a16="http://schemas.microsoft.com/office/drawing/2014/main" id="{E6E84843-0D31-B54A-ABD7-42C7EB91FB51}"/>
+                <a16:creationId xmlns:a16="http://schemas.microsoft.com/office/drawing/2014/main" id="{AE6F0A7D-F2B8-174A-8598-83CA74C5D1CC}"/>
               </a:ext>
             </a:extLst>
           </p:cNvPr>
@@ -49336,7 +49792,7 @@
           <a:p>
             <a:r>
               <a:rPr lang="en-US" dirty="0"/>
-              <a:t>Heap Feng Shui</a:t>
+              <a:t>What to do with a leak?</a:t>
             </a:r>
           </a:p>
         </p:txBody>
@@ -49346,7 +49802,7 @@
           <p:cNvPr id="3" name="Content Placeholder 2">
             <a:extLst>
               <a:ext uri="{FF2B5EF4-FFF2-40B4-BE49-F238E27FC236}">
-                <a16:creationId xmlns:a16="http://schemas.microsoft.com/office/drawing/2014/main" id="{B6659FF2-55BD-F74E-A5B2-E73AF0758E00}"/>
+                <a16:creationId xmlns:a16="http://schemas.microsoft.com/office/drawing/2014/main" id="{B1347AA9-246F-824E-B6B3-01EAA39C3AE7}"/>
               </a:ext>
             </a:extLst>
           </p:cNvPr>
@@ -49363,14 +49819,8 @@
           <a:lstStyle/>
           <a:p>
             <a:r>
-              <a:rPr lang="en-US" dirty="0"/>
-              <a:t>Diagrams…</a:t>
-            </a:r>
-          </a:p>
-          <a:p>
-            <a:r>
-              <a:rPr lang="en-US" dirty="0"/>
-              <a:t>Explain how to bring back the proper chunks</a:t>
+              <a:rPr lang="en-US"/>
+              <a:t>Relative offsets!</a:t>
             </a:r>
           </a:p>
         </p:txBody>
@@ -49378,7 +49828,7 @@
     </p:spTree>
     <p:extLst>
       <p:ext uri="{BB962C8B-B14F-4D97-AF65-F5344CB8AC3E}">
-        <p14:creationId xmlns:p14="http://schemas.microsoft.com/office/powerpoint/2010/main" val="1880247046"/>
+        <p14:creationId xmlns:p14="http://schemas.microsoft.com/office/powerpoint/2010/main" val="396697888"/>
       </p:ext>
     </p:extLst>
   </p:cSld>
@@ -49388,7 +49838,7 @@
 </p:sld>
 </file>
 
-<file path=ppt/slides/slide4.xml><?xml version="1.0" encoding="utf-8"?>
+<file path=ppt/slides/slide42.xml><?xml version="1.0" encoding="utf-8"?>
 <p:sld xmlns:a="http://schemas.openxmlformats.org/drawingml/2006/main" xmlns:r="http://schemas.openxmlformats.org/officeDocument/2006/relationships" xmlns:p="http://schemas.openxmlformats.org/presentationml/2006/main">
   <p:cSld>
     <p:spTree>
@@ -49410,7 +49860,7 @@
           <p:cNvPr id="2" name="Title 1">
             <a:extLst>
               <a:ext uri="{FF2B5EF4-FFF2-40B4-BE49-F238E27FC236}">
-                <a16:creationId xmlns:a16="http://schemas.microsoft.com/office/drawing/2014/main" id="{1BDD0254-2F5D-5D4C-A0D7-2421174D5BB2}"/>
+                <a16:creationId xmlns:a16="http://schemas.microsoft.com/office/drawing/2014/main" id="{1CEC0B6F-883E-A744-9C1E-95C31EF1FB0D}"/>
               </a:ext>
             </a:extLst>
           </p:cNvPr>
@@ -49421,55 +49871,298 @@
             <p:ph type="title"/>
           </p:nvPr>
         </p:nvSpPr>
-        <p:spPr>
-          <a:xfrm>
-            <a:off x="898636" y="125980"/>
-            <a:ext cx="7491124" cy="1126229"/>
-          </a:xfrm>
-        </p:spPr>
+        <p:spPr/>
         <p:txBody>
-          <a:bodyPr anchor="b">
+          <a:bodyPr/>
+          <a:lstStyle/>
+          <a:p>
+            <a:r>
+              <a:rPr lang="en-US" dirty="0"/>
+              <a:t>Challenge #1 – UAF Leak</a:t>
+            </a:r>
+          </a:p>
+        </p:txBody>
+      </p:sp>
+      <p:sp>
+        <p:nvSpPr>
+          <p:cNvPr id="3" name="Content Placeholder 2">
+            <a:extLst>
+              <a:ext uri="{FF2B5EF4-FFF2-40B4-BE49-F238E27FC236}">
+                <a16:creationId xmlns:a16="http://schemas.microsoft.com/office/drawing/2014/main" id="{4A13A033-F04D-054F-B233-99940086B890}"/>
+              </a:ext>
+            </a:extLst>
+          </p:cNvPr>
+          <p:cNvSpPr>
+            <a:spLocks noGrp="1"/>
+          </p:cNvSpPr>
+          <p:nvPr>
+            <p:ph idx="1"/>
+          </p:nvPr>
+        </p:nvSpPr>
+        <p:spPr/>
+        <p:txBody>
+          <a:bodyPr/>
+          <a:lstStyle/>
+          <a:p>
+            <a:endParaRPr lang="en-US"/>
+          </a:p>
+        </p:txBody>
+      </p:sp>
+    </p:spTree>
+    <p:extLst>
+      <p:ext uri="{BB962C8B-B14F-4D97-AF65-F5344CB8AC3E}">
+        <p14:creationId xmlns:p14="http://schemas.microsoft.com/office/powerpoint/2010/main" val="2716938830"/>
+      </p:ext>
+    </p:extLst>
+  </p:cSld>
+  <p:clrMapOvr>
+    <a:masterClrMapping/>
+  </p:clrMapOvr>
+</p:sld>
+</file>
+
+<file path=ppt/slides/slide43.xml><?xml version="1.0" encoding="utf-8"?>
+<p:sld xmlns:a="http://schemas.openxmlformats.org/drawingml/2006/main" xmlns:r="http://schemas.openxmlformats.org/officeDocument/2006/relationships" xmlns:p="http://schemas.openxmlformats.org/presentationml/2006/main">
+  <p:cSld>
+    <p:spTree>
+      <p:nvGrpSpPr>
+        <p:cNvPr id="1" name=""/>
+        <p:cNvGrpSpPr/>
+        <p:nvPr/>
+      </p:nvGrpSpPr>
+      <p:grpSpPr>
+        <a:xfrm>
+          <a:off x="0" y="0"/>
+          <a:ext cx="0" cy="0"/>
+          <a:chOff x="0" y="0"/>
+          <a:chExt cx="0" cy="0"/>
+        </a:xfrm>
+      </p:grpSpPr>
+      <p:sp>
+        <p:nvSpPr>
+          <p:cNvPr id="2" name="Title 1">
+            <a:extLst>
+              <a:ext uri="{FF2B5EF4-FFF2-40B4-BE49-F238E27FC236}">
+                <a16:creationId xmlns:a16="http://schemas.microsoft.com/office/drawing/2014/main" id="{1CEC0B6F-883E-A744-9C1E-95C31EF1FB0D}"/>
+              </a:ext>
+            </a:extLst>
+          </p:cNvPr>
+          <p:cNvSpPr>
+            <a:spLocks noGrp="1"/>
+          </p:cNvSpPr>
+          <p:nvPr>
+            <p:ph type="title"/>
+          </p:nvPr>
+        </p:nvSpPr>
+        <p:spPr/>
+        <p:txBody>
+          <a:bodyPr/>
+          <a:lstStyle/>
+          <a:p>
+            <a:r>
+              <a:rPr lang="en-US" dirty="0"/>
+              <a:t>Solution #1 – UAF Leak</a:t>
+            </a:r>
+          </a:p>
+        </p:txBody>
+      </p:sp>
+      <p:sp>
+        <p:nvSpPr>
+          <p:cNvPr id="3" name="Content Placeholder 2">
+            <a:extLst>
+              <a:ext uri="{FF2B5EF4-FFF2-40B4-BE49-F238E27FC236}">
+                <a16:creationId xmlns:a16="http://schemas.microsoft.com/office/drawing/2014/main" id="{4A13A033-F04D-054F-B233-99940086B890}"/>
+              </a:ext>
+            </a:extLst>
+          </p:cNvPr>
+          <p:cNvSpPr>
+            <a:spLocks noGrp="1"/>
+          </p:cNvSpPr>
+          <p:nvPr>
+            <p:ph idx="1"/>
+          </p:nvPr>
+        </p:nvSpPr>
+        <p:spPr/>
+        <p:txBody>
+          <a:bodyPr/>
+          <a:lstStyle/>
+          <a:p>
+            <a:endParaRPr lang="en-US"/>
+          </a:p>
+        </p:txBody>
+      </p:sp>
+    </p:spTree>
+    <p:extLst>
+      <p:ext uri="{BB962C8B-B14F-4D97-AF65-F5344CB8AC3E}">
+        <p14:creationId xmlns:p14="http://schemas.microsoft.com/office/powerpoint/2010/main" val="593399103"/>
+      </p:ext>
+    </p:extLst>
+  </p:cSld>
+  <p:clrMapOvr>
+    <a:masterClrMapping/>
+  </p:clrMapOvr>
+</p:sld>
+</file>
+
+<file path=ppt/slides/slide44.xml><?xml version="1.0" encoding="utf-8"?>
+<p:sld xmlns:a="http://schemas.openxmlformats.org/drawingml/2006/main" xmlns:r="http://schemas.openxmlformats.org/officeDocument/2006/relationships" xmlns:p="http://schemas.openxmlformats.org/presentationml/2006/main">
+  <p:cSld>
+    <p:spTree>
+      <p:nvGrpSpPr>
+        <p:cNvPr id="1" name=""/>
+        <p:cNvGrpSpPr/>
+        <p:nvPr/>
+      </p:nvGrpSpPr>
+      <p:grpSpPr>
+        <a:xfrm>
+          <a:off x="0" y="0"/>
+          <a:ext cx="0" cy="0"/>
+          <a:chOff x="0" y="0"/>
+          <a:chExt cx="0" cy="0"/>
+        </a:xfrm>
+      </p:grpSpPr>
+      <p:sp>
+        <p:nvSpPr>
+          <p:cNvPr id="2" name="Title 1">
+            <a:extLst>
+              <a:ext uri="{FF2B5EF4-FFF2-40B4-BE49-F238E27FC236}">
+                <a16:creationId xmlns:a16="http://schemas.microsoft.com/office/drawing/2014/main" id="{B6F7C0A1-9A18-7B44-A3A8-D7084833F69A}"/>
+              </a:ext>
+            </a:extLst>
+          </p:cNvPr>
+          <p:cNvSpPr>
+            <a:spLocks noGrp="1"/>
+          </p:cNvSpPr>
+          <p:nvPr>
+            <p:ph type="title"/>
+          </p:nvPr>
+        </p:nvSpPr>
+        <p:spPr/>
+        <p:txBody>
+          <a:bodyPr>
             <a:normAutofit fontScale="90000"/>
           </a:bodyPr>
           <a:lstStyle/>
           <a:p>
             <a:r>
-              <a:rPr lang="en-US"/>
-              <a:t>Address Space Layout Randomization (ASLR)</a:t>
+              <a:rPr lang="en-US" dirty="0"/>
+              <a:t>Challenge #2 – Uninitialized Memory</a:t>
             </a:r>
           </a:p>
         </p:txBody>
       </p:sp>
-      <p:graphicFrame>
-        <p:nvGraphicFramePr>
-          <p:cNvPr id="97" name="Content Placeholder 2">
+      <p:sp>
+        <p:nvSpPr>
+          <p:cNvPr id="3" name="Content Placeholder 2">
             <a:extLst>
               <a:ext uri="{FF2B5EF4-FFF2-40B4-BE49-F238E27FC236}">
-                <a16:creationId xmlns:a16="http://schemas.microsoft.com/office/drawing/2014/main" id="{C57EF78C-8440-4A73-84EF-EBEAEE1365C9}"/>
+                <a16:creationId xmlns:a16="http://schemas.microsoft.com/office/drawing/2014/main" id="{C455E7BB-BB64-5E40-AE58-A081FD4258F2}"/>
               </a:ext>
             </a:extLst>
           </p:cNvPr>
-          <p:cNvGraphicFramePr>
-            <a:graphicFrameLocks noGrp="1"/>
-          </p:cNvGraphicFramePr>
+          <p:cNvSpPr>
+            <a:spLocks noGrp="1"/>
+          </p:cNvSpPr>
           <p:nvPr>
             <p:ph idx="1"/>
           </p:nvPr>
-        </p:nvGraphicFramePr>
-        <p:xfrm>
-          <a:off x="628650" y="1486626"/>
-          <a:ext cx="7886700" cy="3146096"/>
-        </p:xfrm>
-        <a:graphic>
-          <a:graphicData uri="http://schemas.openxmlformats.org/drawingml/2006/diagram">
-            <dgm:relIds xmlns:dgm="http://schemas.openxmlformats.org/drawingml/2006/diagram" xmlns:r="http://schemas.openxmlformats.org/officeDocument/2006/relationships" r:dm="rId2" r:lo="rId3" r:qs="rId4" r:cs="rId5"/>
-          </a:graphicData>
-        </a:graphic>
-      </p:graphicFrame>
+        </p:nvSpPr>
+        <p:spPr/>
+        <p:txBody>
+          <a:bodyPr/>
+          <a:lstStyle/>
+          <a:p>
+            <a:endParaRPr lang="en-US"/>
+          </a:p>
+        </p:txBody>
+      </p:sp>
     </p:spTree>
     <p:extLst>
       <p:ext uri="{BB962C8B-B14F-4D97-AF65-F5344CB8AC3E}">
-        <p14:creationId xmlns:p14="http://schemas.microsoft.com/office/powerpoint/2010/main" val="1628456243"/>
+        <p14:creationId xmlns:p14="http://schemas.microsoft.com/office/powerpoint/2010/main" val="687844757"/>
+      </p:ext>
+    </p:extLst>
+  </p:cSld>
+  <p:clrMapOvr>
+    <a:masterClrMapping/>
+  </p:clrMapOvr>
+</p:sld>
+</file>
+
+<file path=ppt/slides/slide45.xml><?xml version="1.0" encoding="utf-8"?>
+<p:sld xmlns:a="http://schemas.openxmlformats.org/drawingml/2006/main" xmlns:r="http://schemas.openxmlformats.org/officeDocument/2006/relationships" xmlns:p="http://schemas.openxmlformats.org/presentationml/2006/main">
+  <p:cSld>
+    <p:spTree>
+      <p:nvGrpSpPr>
+        <p:cNvPr id="1" name=""/>
+        <p:cNvGrpSpPr/>
+        <p:nvPr/>
+      </p:nvGrpSpPr>
+      <p:grpSpPr>
+        <a:xfrm>
+          <a:off x="0" y="0"/>
+          <a:ext cx="0" cy="0"/>
+          <a:chOff x="0" y="0"/>
+          <a:chExt cx="0" cy="0"/>
+        </a:xfrm>
+      </p:grpSpPr>
+      <p:sp>
+        <p:nvSpPr>
+          <p:cNvPr id="2" name="Title 1">
+            <a:extLst>
+              <a:ext uri="{FF2B5EF4-FFF2-40B4-BE49-F238E27FC236}">
+                <a16:creationId xmlns:a16="http://schemas.microsoft.com/office/drawing/2014/main" id="{38433853-481B-E844-B2B3-B8FBDB89C867}"/>
+              </a:ext>
+            </a:extLst>
+          </p:cNvPr>
+          <p:cNvSpPr>
+            <a:spLocks noGrp="1"/>
+          </p:cNvSpPr>
+          <p:nvPr>
+            <p:ph type="title"/>
+          </p:nvPr>
+        </p:nvSpPr>
+        <p:spPr/>
+        <p:txBody>
+          <a:bodyPr/>
+          <a:lstStyle/>
+          <a:p>
+            <a:r>
+              <a:rPr lang="en-US" dirty="0"/>
+              <a:t>Solution #2</a:t>
+            </a:r>
+          </a:p>
+        </p:txBody>
+      </p:sp>
+      <p:sp>
+        <p:nvSpPr>
+          <p:cNvPr id="3" name="Content Placeholder 2">
+            <a:extLst>
+              <a:ext uri="{FF2B5EF4-FFF2-40B4-BE49-F238E27FC236}">
+                <a16:creationId xmlns:a16="http://schemas.microsoft.com/office/drawing/2014/main" id="{1CD13691-6090-A14E-BABF-21F214A45A20}"/>
+              </a:ext>
+            </a:extLst>
+          </p:cNvPr>
+          <p:cNvSpPr>
+            <a:spLocks noGrp="1"/>
+          </p:cNvSpPr>
+          <p:nvPr>
+            <p:ph idx="1"/>
+          </p:nvPr>
+        </p:nvSpPr>
+        <p:spPr/>
+        <p:txBody>
+          <a:bodyPr/>
+          <a:lstStyle/>
+          <a:p>
+            <a:endParaRPr lang="en-US"/>
+          </a:p>
+        </p:txBody>
+      </p:sp>
+    </p:spTree>
+    <p:extLst>
+      <p:ext uri="{BB962C8B-B14F-4D97-AF65-F5344CB8AC3E}">
+        <p14:creationId xmlns:p14="http://schemas.microsoft.com/office/powerpoint/2010/main" val="1755745598"/>
       </p:ext>
     </p:extLst>
   </p:cSld>
@@ -49653,7 +50346,7 @@
             <a:pPr lvl="1"/>
             <a:r>
               <a:rPr lang="en-US" dirty="0"/>
-              <a:t>Out of bounds reads to leak program, heap and stack addresses</a:t>
+              <a:t>Out of bounds reads, uninitialized memory access, format strings, etc.</a:t>
             </a:r>
           </a:p>
           <a:p>

</xml_diff>